<commit_message>
Ton message ici, par exemple : Ajout de la fonctionnalité X
</commit_message>
<xml_diff>
--- a/media/generated_ppts/DR IAm_CASABLANCA.pptx
+++ b/media/generated_ppts/DR IAm_CASABLANCA.pptx
@@ -3104,6 +3104,11 @@
           <a:bodyPr/>
           <a:lstStyle/>
           <a:p>
+            <a:pPr>
+              <a:defRPr sz="3200">
+                <a:latin typeface="Arial Narrow"/>
+              </a:defRPr>
+            </a:pPr>
             <a:r>
               <a:t>Données pour DR IAm: CASABLANCA</a:t>
             </a:r>
@@ -3125,6 +3130,11 @@
           <a:bodyPr/>
           <a:lstStyle/>
           <a:p>
+            <a:pPr>
+              <a:defRPr sz="1800">
+                <a:latin typeface="Arial Narrow"/>
+              </a:defRPr>
+            </a:pPr>
             <a:r>
               <a:t>Nombre d'enregistrements: 15</a:t>
             </a:r>
@@ -3164,6 +3174,11 @@
           <a:bodyPr/>
           <a:lstStyle/>
           <a:p>
+            <a:pPr>
+              <a:defRPr sz="2400">
+                <a:latin typeface="Arial Narrow"/>
+              </a:defRPr>
+            </a:pPr>
             <a:r>
               <a:t>Détails - CASABLANCA</a:t>
             </a:r>
@@ -3196,8 +3211,8 @@
           <p:nvPr/>
         </p:nvGraphicFramePr>
         <p:xfrm>
-          <a:off x="457200" y="1828800"/>
-          <a:ext cx="8229600" cy="4572000"/>
+          <a:off x="360000" y="1645920"/>
+          <a:ext cx="8747999" cy="1529999"/>
         </p:xfrm>
         <a:graphic>
           <a:graphicData uri="http://schemas.openxmlformats.org/drawingml/2006/table">
@@ -3206,41 +3221,214 @@
                 <a:tableStyleId>{5C22544A-7EE6-4342-B048-85BDC9FD1C3A}</a:tableStyleId>
               </a:tblPr>
               <a:tblGrid>
-                <a:gridCol w="587828"/>
-                <a:gridCol w="587828"/>
-                <a:gridCol w="587828"/>
-                <a:gridCol w="587828"/>
-                <a:gridCol w="587828"/>
-                <a:gridCol w="587828"/>
-                <a:gridCol w="587828"/>
-                <a:gridCol w="587828"/>
-                <a:gridCol w="587828"/>
-                <a:gridCol w="587828"/>
-                <a:gridCol w="587828"/>
-                <a:gridCol w="587828"/>
-                <a:gridCol w="587828"/>
-                <a:gridCol w="587836"/>
+                <a:gridCol w="648000"/>
+                <a:gridCol w="864000"/>
+                <a:gridCol w="1332000"/>
+                <a:gridCol w="936000"/>
+                <a:gridCol w="1007999"/>
+                <a:gridCol w="2232000"/>
+                <a:gridCol w="1728000"/>
               </a:tblGrid>
-              <a:tr h="285750">
-                <a:tc>
-                  <a:txBody>
-                    <a:bodyPr/>
-                    <a:lstStyle/>
-                    <a:p>
+              <a:tr h="125999">
+                <a:tc>
+                  <a:txBody>
+                    <a:bodyPr tIns="18288" bIns="18288" lIns="45720" rIns="45720"/>
+                    <a:lstStyle/>
+                    <a:p>
+                      <a:pPr>
+                        <a:defRPr sz="700" b="1">
+                          <a:solidFill>
+                            <a:srgbClr val="FFFFFF"/>
+                          </a:solidFill>
+                          <a:latin typeface="Arial Narrow"/>
+                        </a:defRPr>
+                      </a:pPr>
                       <a:r>
                         <a:t>code site</a:t>
                       </a:r>
                     </a:p>
                   </a:txBody>
+                  <a:tcPr>
+                    <a:solidFill>
+                      <a:srgbClr val="4472C4"/>
+                    </a:solidFill>
+                  </a:tcPr>
+                </a:tc>
+                <a:tc>
+                  <a:txBody>
+                    <a:bodyPr tIns="18288" bIns="18288" lIns="45720" rIns="45720"/>
+                    <a:lstStyle/>
+                    <a:p>
+                      <a:pPr>
+                        <a:defRPr sz="700" b="1">
+                          <a:solidFill>
+                            <a:srgbClr val="FFFFFF"/>
+                          </a:solidFill>
+                          <a:latin typeface="Arial Narrow"/>
+                        </a:defRPr>
+                      </a:pPr>
+                      <a:r>
+                        <a:t>ST FO</a:t>
+                      </a:r>
+                    </a:p>
+                  </a:txBody>
+                  <a:tcPr>
+                    <a:solidFill>
+                      <a:srgbClr val="4472C4"/>
+                    </a:solidFill>
+                  </a:tcPr>
+                </a:tc>
+                <a:tc>
+                  <a:txBody>
+                    <a:bodyPr tIns="18288" bIns="18288" lIns="45720" rIns="45720"/>
+                    <a:lstStyle/>
+                    <a:p>
+                      <a:pPr>
+                        <a:defRPr sz="700" b="1">
+                          <a:solidFill>
+                            <a:srgbClr val="FFFFFF"/>
+                          </a:solidFill>
+                          <a:latin typeface="Arial Narrow"/>
+                        </a:defRPr>
+                      </a:pPr>
+                      <a:r>
+                        <a:t>contact ERPT</a:t>
+                      </a:r>
+                    </a:p>
+                  </a:txBody>
+                  <a:tcPr>
+                    <a:solidFill>
+                      <a:srgbClr val="4472C4"/>
+                    </a:solidFill>
+                  </a:tcPr>
+                </a:tc>
+                <a:tc>
+                  <a:txBody>
+                    <a:bodyPr tIns="18288" bIns="18288" lIns="45720" rIns="45720"/>
+                    <a:lstStyle/>
+                    <a:p>
+                      <a:pPr>
+                        <a:defRPr sz="700" b="1">
+                          <a:solidFill>
+                            <a:srgbClr val="FFFFFF"/>
+                          </a:solidFill>
+                          <a:latin typeface="Arial Narrow"/>
+                        </a:defRPr>
+                      </a:pPr>
+                      <a:r>
+                        <a:t>DR IAm</a:t>
+                      </a:r>
+                    </a:p>
+                  </a:txBody>
+                  <a:tcPr>
+                    <a:solidFill>
+                      <a:srgbClr val="4472C4"/>
+                    </a:solidFill>
+                  </a:tcPr>
+                </a:tc>
+                <a:tc>
+                  <a:txBody>
+                    <a:bodyPr tIns="18288" bIns="18288" lIns="45720" rIns="45720"/>
+                    <a:lstStyle/>
+                    <a:p>
+                      <a:pPr>
+                        <a:defRPr sz="700" b="1">
+                          <a:solidFill>
+                            <a:srgbClr val="FFFFFF"/>
+                          </a:solidFill>
+                          <a:latin typeface="Arial Narrow"/>
+                        </a:defRPr>
+                      </a:pPr>
+                      <a:r>
+                        <a:t>ville</a:t>
+                      </a:r>
+                    </a:p>
+                  </a:txBody>
+                  <a:tcPr>
+                    <a:solidFill>
+                      <a:srgbClr val="4472C4"/>
+                    </a:solidFill>
+                  </a:tcPr>
+                </a:tc>
+                <a:tc>
+                  <a:txBody>
+                    <a:bodyPr tIns="18288" bIns="18288" lIns="45720" rIns="45720"/>
+                    <a:lstStyle/>
+                    <a:p>
+                      <a:pPr>
+                        <a:defRPr sz="700" b="1">
+                          <a:solidFill>
+                            <a:srgbClr val="FFFFFF"/>
+                          </a:solidFill>
+                          <a:latin typeface="Arial Narrow"/>
+                        </a:defRPr>
+                      </a:pPr>
+                      <a:r>
+                        <a:t>X Départ ERPT - Y Départ ERPT</a:t>
+                      </a:r>
+                    </a:p>
+                  </a:txBody>
+                  <a:tcPr>
+                    <a:solidFill>
+                      <a:srgbClr val="4472C4"/>
+                    </a:solidFill>
+                  </a:tcPr>
+                </a:tc>
+                <a:tc>
+                  <a:txBody>
+                    <a:bodyPr tIns="18288" bIns="18288" lIns="45720" rIns="45720"/>
+                    <a:lstStyle/>
+                    <a:p>
+                      <a:pPr>
+                        <a:defRPr sz="700" b="1">
+                          <a:solidFill>
+                            <a:srgbClr val="FFFFFF"/>
+                          </a:solidFill>
+                          <a:latin typeface="Arial Narrow"/>
+                        </a:defRPr>
+                      </a:pPr>
+                      <a:r>
+                        <a:t>X Arrivée ERPT Proposition1 - Y Arrivée ERPT Proposition1</a:t>
+                      </a:r>
+                    </a:p>
+                  </a:txBody>
+                  <a:tcPr>
+                    <a:solidFill>
+                      <a:srgbClr val="4472C4"/>
+                    </a:solidFill>
+                  </a:tcPr>
+                </a:tc>
+              </a:tr>
+              <a:tr h="93600">
+                <a:tc>
+                  <a:txBody>
+                    <a:bodyPr tIns="18288" bIns="18288" lIns="45720" rIns="45720"/>
+                    <a:lstStyle/>
+                    <a:p>
+                      <a:pPr>
+                        <a:defRPr sz="700">
+                          <a:latin typeface="Arial Narrow"/>
+                        </a:defRPr>
+                      </a:pPr>
+                      <a:r>
+                        <a:t>MOH723</a:t>
+                      </a:r>
+                    </a:p>
+                  </a:txBody>
                   <a:tcPr/>
                 </a:tc>
                 <a:tc>
                   <a:txBody>
-                    <a:bodyPr/>
-                    <a:lstStyle/>
-                    <a:p>
-                      <a:r>
-                        <a:t>ST FO</a:t>
+                    <a:bodyPr tIns="18288" bIns="18288" lIns="45720" rIns="45720"/>
+                    <a:lstStyle/>
+                    <a:p>
+                      <a:pPr>
+                        <a:defRPr sz="700">
+                          <a:latin typeface="Arial Narrow"/>
+                        </a:defRPr>
+                      </a:pPr>
+                      <a:r>
+                        <a:t>VERNE</a:t>
                       </a:r>
                     </a:p>
                   </a:txBody>
@@ -3248,11 +3436,16 @@
                 </a:tc>
                 <a:tc>
                   <a:txBody>
-                    <a:bodyPr/>
-                    <a:lstStyle/>
-                    <a:p>
-                      <a:r>
-                        <a:t>Mois Survey &amp; Aiguillage</a:t>
+                    <a:bodyPr tIns="18288" bIns="18288" lIns="45720" rIns="45720"/>
+                    <a:lstStyle/>
+                    <a:p>
+                      <a:pPr>
+                        <a:defRPr sz="700">
+                          <a:latin typeface="Arial Narrow"/>
+                        </a:defRPr>
+                      </a:pPr>
+                      <a:r>
+                        <a:t>0660127763 AZEDDINE</a:t>
                       </a:r>
                     </a:p>
                   </a:txBody>
@@ -3260,11 +3453,16 @@
                 </a:tc>
                 <a:tc>
                   <a:txBody>
-                    <a:bodyPr/>
-                    <a:lstStyle/>
-                    <a:p>
-                      <a:r>
-                        <a:t>Semaine Survey &amp; Aiguillage</a:t>
+                    <a:bodyPr tIns="18288" bIns="18288" lIns="45720" rIns="45720"/>
+                    <a:lstStyle/>
+                    <a:p>
+                      <a:pPr>
+                        <a:defRPr sz="700">
+                          <a:latin typeface="Arial Narrow"/>
+                        </a:defRPr>
+                      </a:pPr>
+                      <a:r>
+                        <a:t>CASABLANCA</a:t>
                       </a:r>
                     </a:p>
                   </a:txBody>
@@ -3272,11 +3470,16 @@
                 </a:tc>
                 <a:tc>
                   <a:txBody>
-                    <a:bodyPr/>
-                    <a:lstStyle/>
-                    <a:p>
-                      <a:r>
-                        <a:t>Planning Survey &amp; Aiguillage</a:t>
+                    <a:bodyPr tIns="18288" bIns="18288" lIns="45720" rIns="45720"/>
+                    <a:lstStyle/>
+                    <a:p>
+                      <a:pPr>
+                        <a:defRPr sz="700">
+                          <a:latin typeface="Arial Narrow"/>
+                        </a:defRPr>
+                      </a:pPr>
+                      <a:r>
+                        <a:t>Mohammadia</a:t>
                       </a:r>
                     </a:p>
                   </a:txBody>
@@ -3284,11 +3487,16 @@
                 </a:tc>
                 <a:tc>
                   <a:txBody>
-                    <a:bodyPr/>
-                    <a:lstStyle/>
-                    <a:p>
-                      <a:r>
-                        <a:t>date proposé par IAM pour le survey avec orange (semaine)</a:t>
+                    <a:bodyPr tIns="18288" bIns="18288" lIns="45720" rIns="45720"/>
+                    <a:lstStyle/>
+                    <a:p>
+                      <a:pPr>
+                        <a:defRPr sz="700">
+                          <a:latin typeface="Arial Narrow"/>
+                        </a:defRPr>
+                      </a:pPr>
+                      <a:r>
+                        <a:t>33.665175,-7.360709</a:t>
                       </a:r>
                     </a:p>
                   </a:txBody>
@@ -3296,23 +3504,184 @@
                 </a:tc>
                 <a:tc>
                   <a:txBody>
-                    <a:bodyPr/>
-                    <a:lstStyle/>
-                    <a:p>
-                      <a:r>
-                        <a:t>Contact ERPT</a:t>
+                    <a:bodyPr tIns="18288" bIns="18288" lIns="45720" rIns="45720"/>
+                    <a:lstStyle/>
+                    <a:p>
+                      <a:pPr>
+                        <a:defRPr sz="700">
+                          <a:latin typeface="Arial Narrow"/>
+                        </a:defRPr>
+                      </a:pPr>
+                      <a:r>
+                        <a:t>33.663564,-7.366709</a:t>
                       </a:r>
                     </a:p>
                   </a:txBody>
                   <a:tcPr/>
                 </a:tc>
-                <a:tc>
-                  <a:txBody>
-                    <a:bodyPr/>
-                    <a:lstStyle/>
-                    <a:p>
-                      <a:r>
-                        <a:t>Contact IAM</a:t>
+              </a:tr>
+              <a:tr h="93600">
+                <a:tc>
+                  <a:txBody>
+                    <a:bodyPr tIns="18288" bIns="18288" lIns="45720" rIns="45720"/>
+                    <a:lstStyle/>
+                    <a:p>
+                      <a:pPr>
+                        <a:defRPr sz="700">
+                          <a:latin typeface="Arial Narrow"/>
+                        </a:defRPr>
+                      </a:pPr>
+                      <a:r>
+                        <a:t>MOH694</a:t>
+                      </a:r>
+                    </a:p>
+                  </a:txBody>
+                  <a:tcPr>
+                    <a:solidFill>
+                      <a:srgbClr val="F2F2F2"/>
+                    </a:solidFill>
+                  </a:tcPr>
+                </a:tc>
+                <a:tc>
+                  <a:txBody>
+                    <a:bodyPr tIns="18288" bIns="18288" lIns="45720" rIns="45720"/>
+                    <a:lstStyle/>
+                    <a:p>
+                      <a:pPr>
+                        <a:defRPr sz="700">
+                          <a:latin typeface="Arial Narrow"/>
+                        </a:defRPr>
+                      </a:pPr>
+                      <a:r>
+                        <a:t>VERNE</a:t>
+                      </a:r>
+                    </a:p>
+                  </a:txBody>
+                  <a:tcPr>
+                    <a:solidFill>
+                      <a:srgbClr val="F2F2F2"/>
+                    </a:solidFill>
+                  </a:tcPr>
+                </a:tc>
+                <a:tc>
+                  <a:txBody>
+                    <a:bodyPr tIns="18288" bIns="18288" lIns="45720" rIns="45720"/>
+                    <a:lstStyle/>
+                    <a:p>
+                      <a:pPr>
+                        <a:defRPr sz="700">
+                          <a:latin typeface="Arial Narrow"/>
+                        </a:defRPr>
+                      </a:pPr>
+                      <a:r>
+                        <a:t>0660127763 AZEDDINE</a:t>
+                      </a:r>
+                    </a:p>
+                  </a:txBody>
+                  <a:tcPr>
+                    <a:solidFill>
+                      <a:srgbClr val="F2F2F2"/>
+                    </a:solidFill>
+                  </a:tcPr>
+                </a:tc>
+                <a:tc>
+                  <a:txBody>
+                    <a:bodyPr tIns="18288" bIns="18288" lIns="45720" rIns="45720"/>
+                    <a:lstStyle/>
+                    <a:p>
+                      <a:pPr>
+                        <a:defRPr sz="700">
+                          <a:latin typeface="Arial Narrow"/>
+                        </a:defRPr>
+                      </a:pPr>
+                      <a:r>
+                        <a:t>CASABLANCA</a:t>
+                      </a:r>
+                    </a:p>
+                  </a:txBody>
+                  <a:tcPr>
+                    <a:solidFill>
+                      <a:srgbClr val="F2F2F2"/>
+                    </a:solidFill>
+                  </a:tcPr>
+                </a:tc>
+                <a:tc>
+                  <a:txBody>
+                    <a:bodyPr tIns="18288" bIns="18288" lIns="45720" rIns="45720"/>
+                    <a:lstStyle/>
+                    <a:p>
+                      <a:pPr>
+                        <a:defRPr sz="700">
+                          <a:latin typeface="Arial Narrow"/>
+                        </a:defRPr>
+                      </a:pPr>
+                      <a:r>
+                        <a:t>Mohammadia</a:t>
+                      </a:r>
+                    </a:p>
+                  </a:txBody>
+                  <a:tcPr>
+                    <a:solidFill>
+                      <a:srgbClr val="F2F2F2"/>
+                    </a:solidFill>
+                  </a:tcPr>
+                </a:tc>
+                <a:tc>
+                  <a:txBody>
+                    <a:bodyPr tIns="18288" bIns="18288" lIns="45720" rIns="45720"/>
+                    <a:lstStyle/>
+                    <a:p>
+                      <a:pPr>
+                        <a:defRPr sz="700">
+                          <a:latin typeface="Arial Narrow"/>
+                        </a:defRPr>
+                      </a:pPr>
+                      <a:r>
+                        <a:t>33.6630278,-7.4139166</a:t>
+                      </a:r>
+                    </a:p>
+                  </a:txBody>
+                  <a:tcPr>
+                    <a:solidFill>
+                      <a:srgbClr val="F2F2F2"/>
+                    </a:solidFill>
+                  </a:tcPr>
+                </a:tc>
+                <a:tc>
+                  <a:txBody>
+                    <a:bodyPr tIns="18288" bIns="18288" lIns="45720" rIns="45720"/>
+                    <a:lstStyle/>
+                    <a:p>
+                      <a:pPr>
+                        <a:defRPr sz="700">
+                          <a:latin typeface="Arial Narrow"/>
+                        </a:defRPr>
+                      </a:pPr>
+                      <a:r>
+                        <a:t>33.665219,-7.411335</a:t>
+                      </a:r>
+                    </a:p>
+                  </a:txBody>
+                  <a:tcPr>
+                    <a:solidFill>
+                      <a:srgbClr val="F2F2F2"/>
+                    </a:solidFill>
+                  </a:tcPr>
+                </a:tc>
+              </a:tr>
+              <a:tr h="93600">
+                <a:tc>
+                  <a:txBody>
+                    <a:bodyPr tIns="18288" bIns="18288" lIns="45720" rIns="45720"/>
+                    <a:lstStyle/>
+                    <a:p>
+                      <a:pPr>
+                        <a:defRPr sz="700">
+                          <a:latin typeface="Arial Narrow"/>
+                        </a:defRPr>
+                      </a:pPr>
+                      <a:r>
+                        <a:t>MOH705</a:t>
                       </a:r>
                     </a:p>
                   </a:txBody>
@@ -3320,11 +3689,16 @@
                 </a:tc>
                 <a:tc>
                   <a:txBody>
-                    <a:bodyPr/>
-                    <a:lstStyle/>
-                    <a:p>
-                      <a:r>
-                        <a:t>DR IAm</a:t>
+                    <a:bodyPr tIns="18288" bIns="18288" lIns="45720" rIns="45720"/>
+                    <a:lstStyle/>
+                    <a:p>
+                      <a:pPr>
+                        <a:defRPr sz="700">
+                          <a:latin typeface="Arial Narrow"/>
+                        </a:defRPr>
+                      </a:pPr>
+                      <a:r>
+                        <a:t>VERNE</a:t>
                       </a:r>
                     </a:p>
                   </a:txBody>
@@ -3332,11 +3706,16 @@
                 </a:tc>
                 <a:tc>
                   <a:txBody>
-                    <a:bodyPr/>
-                    <a:lstStyle/>
-                    <a:p>
-                      <a:r>
-                        <a:t>ville</a:t>
+                    <a:bodyPr tIns="18288" bIns="18288" lIns="45720" rIns="45720"/>
+                    <a:lstStyle/>
+                    <a:p>
+                      <a:pPr>
+                        <a:defRPr sz="700">
+                          <a:latin typeface="Arial Narrow"/>
+                        </a:defRPr>
+                      </a:pPr>
+                      <a:r>
+                        <a:t>0660127763 AZEDDINE</a:t>
                       </a:r>
                     </a:p>
                   </a:txBody>
@@ -3344,11 +3723,16 @@
                 </a:tc>
                 <a:tc>
                   <a:txBody>
-                    <a:bodyPr/>
-                    <a:lstStyle/>
-                    <a:p>
-                      <a:r>
-                        <a:t>X Départ  ERPT  - Y Départ ERPT</a:t>
+                    <a:bodyPr tIns="18288" bIns="18288" lIns="45720" rIns="45720"/>
+                    <a:lstStyle/>
+                    <a:p>
+                      <a:pPr>
+                        <a:defRPr sz="700">
+                          <a:latin typeface="Arial Narrow"/>
+                        </a:defRPr>
+                      </a:pPr>
+                      <a:r>
+                        <a:t>CASABLANCA</a:t>
                       </a:r>
                     </a:p>
                   </a:txBody>
@@ -3356,11 +3740,16 @@
                 </a:tc>
                 <a:tc>
                   <a:txBody>
-                    <a:bodyPr/>
-                    <a:lstStyle/>
-                    <a:p>
-                      <a:r>
-                        <a:t>X Arrivée ERPT Proposition1 - Y Arrivée ERPT Proposition1</a:t>
+                    <a:bodyPr tIns="18288" bIns="18288" lIns="45720" rIns="45720"/>
+                    <a:lstStyle/>
+                    <a:p>
+                      <a:pPr>
+                        <a:defRPr sz="700">
+                          <a:latin typeface="Arial Narrow"/>
+                        </a:defRPr>
+                      </a:pPr>
+                      <a:r>
+                        <a:t>Mohammadia</a:t>
                       </a:r>
                     </a:p>
                   </a:txBody>
@@ -3368,11 +3757,16 @@
                 </a:tc>
                 <a:tc>
                   <a:txBody>
-                    <a:bodyPr/>
-                    <a:lstStyle/>
-                    <a:p>
-                      <a:r>
-                        <a:t>Commentaire ERPT</a:t>
+                    <a:bodyPr tIns="18288" bIns="18288" lIns="45720" rIns="45720"/>
+                    <a:lstStyle/>
+                    <a:p>
+                      <a:pPr>
+                        <a:defRPr sz="700">
+                          <a:latin typeface="Arial Narrow"/>
+                        </a:defRPr>
+                      </a:pPr>
+                      <a:r>
+                        <a:t>33.678323,-7.391892</a:t>
                       </a:r>
                     </a:p>
                   </a:txBody>
@@ -3380,25 +3774,184 @@
                 </a:tc>
                 <a:tc>
                   <a:txBody>
-                    <a:bodyPr/>
-                    <a:lstStyle/>
-                    <a:p>
-                      <a:r>
-                        <a:t>Date TSS</a:t>
+                    <a:bodyPr tIns="18288" bIns="18288" lIns="45720" rIns="45720"/>
+                    <a:lstStyle/>
+                    <a:p>
+                      <a:pPr>
+                        <a:defRPr sz="700">
+                          <a:latin typeface="Arial Narrow"/>
+                        </a:defRPr>
+                      </a:pPr>
+                      <a:r>
+                        <a:t>33.6785160,-7.3921373</a:t>
                       </a:r>
                     </a:p>
                   </a:txBody>
                   <a:tcPr/>
                 </a:tc>
               </a:tr>
-              <a:tr h="285750">
-                <a:tc>
-                  <a:txBody>
-                    <a:bodyPr/>
-                    <a:lstStyle/>
-                    <a:p>
-                      <a:r>
-                        <a:t>MOH723</a:t>
+              <a:tr h="93600">
+                <a:tc>
+                  <a:txBody>
+                    <a:bodyPr tIns="18288" bIns="18288" lIns="45720" rIns="45720"/>
+                    <a:lstStyle/>
+                    <a:p>
+                      <a:pPr>
+                        <a:defRPr sz="700">
+                          <a:latin typeface="Arial Narrow"/>
+                        </a:defRPr>
+                      </a:pPr>
+                      <a:r>
+                        <a:t>MOH709</a:t>
+                      </a:r>
+                    </a:p>
+                  </a:txBody>
+                  <a:tcPr>
+                    <a:solidFill>
+                      <a:srgbClr val="F2F2F2"/>
+                    </a:solidFill>
+                  </a:tcPr>
+                </a:tc>
+                <a:tc>
+                  <a:txBody>
+                    <a:bodyPr tIns="18288" bIns="18288" lIns="45720" rIns="45720"/>
+                    <a:lstStyle/>
+                    <a:p>
+                      <a:pPr>
+                        <a:defRPr sz="700">
+                          <a:latin typeface="Arial Narrow"/>
+                        </a:defRPr>
+                      </a:pPr>
+                      <a:r>
+                        <a:t>VERNE</a:t>
+                      </a:r>
+                    </a:p>
+                  </a:txBody>
+                  <a:tcPr>
+                    <a:solidFill>
+                      <a:srgbClr val="F2F2F2"/>
+                    </a:solidFill>
+                  </a:tcPr>
+                </a:tc>
+                <a:tc>
+                  <a:txBody>
+                    <a:bodyPr tIns="18288" bIns="18288" lIns="45720" rIns="45720"/>
+                    <a:lstStyle/>
+                    <a:p>
+                      <a:pPr>
+                        <a:defRPr sz="700">
+                          <a:latin typeface="Arial Narrow"/>
+                        </a:defRPr>
+                      </a:pPr>
+                      <a:r>
+                        <a:t>0660127763 AZEDDINE</a:t>
+                      </a:r>
+                    </a:p>
+                  </a:txBody>
+                  <a:tcPr>
+                    <a:solidFill>
+                      <a:srgbClr val="F2F2F2"/>
+                    </a:solidFill>
+                  </a:tcPr>
+                </a:tc>
+                <a:tc>
+                  <a:txBody>
+                    <a:bodyPr tIns="18288" bIns="18288" lIns="45720" rIns="45720"/>
+                    <a:lstStyle/>
+                    <a:p>
+                      <a:pPr>
+                        <a:defRPr sz="700">
+                          <a:latin typeface="Arial Narrow"/>
+                        </a:defRPr>
+                      </a:pPr>
+                      <a:r>
+                        <a:t>CASABLANCA</a:t>
+                      </a:r>
+                    </a:p>
+                  </a:txBody>
+                  <a:tcPr>
+                    <a:solidFill>
+                      <a:srgbClr val="F2F2F2"/>
+                    </a:solidFill>
+                  </a:tcPr>
+                </a:tc>
+                <a:tc>
+                  <a:txBody>
+                    <a:bodyPr tIns="18288" bIns="18288" lIns="45720" rIns="45720"/>
+                    <a:lstStyle/>
+                    <a:p>
+                      <a:pPr>
+                        <a:defRPr sz="700">
+                          <a:latin typeface="Arial Narrow"/>
+                        </a:defRPr>
+                      </a:pPr>
+                      <a:r>
+                        <a:t>Mohammadia</a:t>
+                      </a:r>
+                    </a:p>
+                  </a:txBody>
+                  <a:tcPr>
+                    <a:solidFill>
+                      <a:srgbClr val="F2F2F2"/>
+                    </a:solidFill>
+                  </a:tcPr>
+                </a:tc>
+                <a:tc>
+                  <a:txBody>
+                    <a:bodyPr tIns="18288" bIns="18288" lIns="45720" rIns="45720"/>
+                    <a:lstStyle/>
+                    <a:p>
+                      <a:pPr>
+                        <a:defRPr sz="700">
+                          <a:latin typeface="Arial Narrow"/>
+                        </a:defRPr>
+                      </a:pPr>
+                      <a:r>
+                        <a:t>33.685353,-7.387889</a:t>
+                      </a:r>
+                    </a:p>
+                  </a:txBody>
+                  <a:tcPr>
+                    <a:solidFill>
+                      <a:srgbClr val="F2F2F2"/>
+                    </a:solidFill>
+                  </a:tcPr>
+                </a:tc>
+                <a:tc>
+                  <a:txBody>
+                    <a:bodyPr tIns="18288" bIns="18288" lIns="45720" rIns="45720"/>
+                    <a:lstStyle/>
+                    <a:p>
+                      <a:pPr>
+                        <a:defRPr sz="700">
+                          <a:latin typeface="Arial Narrow"/>
+                        </a:defRPr>
+                      </a:pPr>
+                      <a:r>
+                        <a:t>33.683649,-7.385638</a:t>
+                      </a:r>
+                    </a:p>
+                  </a:txBody>
+                  <a:tcPr>
+                    <a:solidFill>
+                      <a:srgbClr val="F2F2F2"/>
+                    </a:solidFill>
+                  </a:tcPr>
+                </a:tc>
+              </a:tr>
+              <a:tr h="93600">
+                <a:tc>
+                  <a:txBody>
+                    <a:bodyPr tIns="18288" bIns="18288" lIns="45720" rIns="45720"/>
+                    <a:lstStyle/>
+                    <a:p>
+                      <a:pPr>
+                        <a:defRPr sz="700">
+                          <a:latin typeface="Arial Narrow"/>
+                        </a:defRPr>
+                      </a:pPr>
+                      <a:r>
+                        <a:t>MOH707</a:t>
                       </a:r>
                     </a:p>
                   </a:txBody>
@@ -3406,9 +3959,14 @@
                 </a:tc>
                 <a:tc>
                   <a:txBody>
-                    <a:bodyPr/>
-                    <a:lstStyle/>
-                    <a:p>
+                    <a:bodyPr tIns="18288" bIns="18288" lIns="45720" rIns="45720"/>
+                    <a:lstStyle/>
+                    <a:p>
+                      <a:pPr>
+                        <a:defRPr sz="700">
+                          <a:latin typeface="Arial Narrow"/>
+                        </a:defRPr>
+                      </a:pPr>
                       <a:r>
                         <a:t>VERNE</a:t>
                       </a:r>
@@ -3418,11 +3976,16 @@
                 </a:tc>
                 <a:tc>
                   <a:txBody>
-                    <a:bodyPr/>
-                    <a:lstStyle/>
-                    <a:p>
-                      <a:r>
-                        <a:t>JUIN</a:t>
+                    <a:bodyPr tIns="18288" bIns="18288" lIns="45720" rIns="45720"/>
+                    <a:lstStyle/>
+                    <a:p>
+                      <a:pPr>
+                        <a:defRPr sz="700">
+                          <a:latin typeface="Arial Narrow"/>
+                        </a:defRPr>
+                      </a:pPr>
+                      <a:r>
+                        <a:t>0660127763 AZEDDINE</a:t>
                       </a:r>
                     </a:p>
                   </a:txBody>
@@ -3430,11 +3993,16 @@
                 </a:tc>
                 <a:tc>
                   <a:txBody>
-                    <a:bodyPr/>
-                    <a:lstStyle/>
-                    <a:p>
-                      <a:r>
-                        <a:t>Du 01/06/2024 Au 31/09/2024</a:t>
+                    <a:bodyPr tIns="18288" bIns="18288" lIns="45720" rIns="45720"/>
+                    <a:lstStyle/>
+                    <a:p>
+                      <a:pPr>
+                        <a:defRPr sz="700">
+                          <a:latin typeface="Arial Narrow"/>
+                        </a:defRPr>
+                      </a:pPr>
+                      <a:r>
+                        <a:t>CASABLANCA</a:t>
                       </a:r>
                     </a:p>
                   </a:txBody>
@@ -3442,11 +4010,16 @@
                 </a:tc>
                 <a:tc>
                   <a:txBody>
-                    <a:bodyPr/>
-                    <a:lstStyle/>
-                    <a:p>
-                      <a:r>
-                        <a:t>Du 01/06/2024 Au 31/09/2024</a:t>
+                    <a:bodyPr tIns="18288" bIns="18288" lIns="45720" rIns="45720"/>
+                    <a:lstStyle/>
+                    <a:p>
+                      <a:pPr>
+                        <a:defRPr sz="700">
+                          <a:latin typeface="Arial Narrow"/>
+                        </a:defRPr>
+                      </a:pPr>
+                      <a:r>
+                        <a:t>Mohammadia</a:t>
                       </a:r>
                     </a:p>
                   </a:txBody>
@@ -3454,37 +4027,250 @@
                 </a:tc>
                 <a:tc>
                   <a:txBody>
-                    <a:bodyPr/>
-                    <a:lstStyle/>
-                    <a:p/>
+                    <a:bodyPr tIns="18288" bIns="18288" lIns="45720" rIns="45720"/>
+                    <a:lstStyle/>
+                    <a:p>
+                      <a:pPr>
+                        <a:defRPr sz="700">
+                          <a:latin typeface="Arial Narrow"/>
+                        </a:defRPr>
+                      </a:pPr>
+                      <a:r>
+                        <a:t>33.690882,-7.382083</a:t>
+                      </a:r>
+                    </a:p>
                   </a:txBody>
                   <a:tcPr/>
                 </a:tc>
                 <a:tc>
                   <a:txBody>
-                    <a:bodyPr/>
-                    <a:lstStyle/>
-                    <a:p>
+                    <a:bodyPr tIns="18288" bIns="18288" lIns="45720" rIns="45720"/>
+                    <a:lstStyle/>
+                    <a:p>
+                      <a:pPr>
+                        <a:defRPr sz="700">
+                          <a:latin typeface="Arial Narrow"/>
+                        </a:defRPr>
+                      </a:pPr>
+                      <a:r>
+                        <a:t>33.689770,-7.380831</a:t>
+                      </a:r>
+                    </a:p>
+                  </a:txBody>
+                  <a:tcPr/>
+                </a:tc>
+              </a:tr>
+              <a:tr h="93600">
+                <a:tc>
+                  <a:txBody>
+                    <a:bodyPr tIns="18288" bIns="18288" lIns="45720" rIns="45720"/>
+                    <a:lstStyle/>
+                    <a:p>
+                      <a:pPr>
+                        <a:defRPr sz="700">
+                          <a:latin typeface="Arial Narrow"/>
+                        </a:defRPr>
+                      </a:pPr>
+                      <a:r>
+                        <a:t>MOH708</a:t>
+                      </a:r>
+                    </a:p>
+                  </a:txBody>
+                  <a:tcPr>
+                    <a:solidFill>
+                      <a:srgbClr val="F2F2F2"/>
+                    </a:solidFill>
+                  </a:tcPr>
+                </a:tc>
+                <a:tc>
+                  <a:txBody>
+                    <a:bodyPr tIns="18288" bIns="18288" lIns="45720" rIns="45720"/>
+                    <a:lstStyle/>
+                    <a:p>
+                      <a:pPr>
+                        <a:defRPr sz="700">
+                          <a:latin typeface="Arial Narrow"/>
+                        </a:defRPr>
+                      </a:pPr>
+                      <a:r>
+                        <a:t>VERNE</a:t>
+                      </a:r>
+                    </a:p>
+                  </a:txBody>
+                  <a:tcPr>
+                    <a:solidFill>
+                      <a:srgbClr val="F2F2F2"/>
+                    </a:solidFill>
+                  </a:tcPr>
+                </a:tc>
+                <a:tc>
+                  <a:txBody>
+                    <a:bodyPr tIns="18288" bIns="18288" lIns="45720" rIns="45720"/>
+                    <a:lstStyle/>
+                    <a:p>
+                      <a:pPr>
+                        <a:defRPr sz="700">
+                          <a:latin typeface="Arial Narrow"/>
+                        </a:defRPr>
+                      </a:pPr>
                       <a:r>
                         <a:t>0660127763 AZEDDINE</a:t>
                       </a:r>
                     </a:p>
                   </a:txBody>
+                  <a:tcPr>
+                    <a:solidFill>
+                      <a:srgbClr val="F2F2F2"/>
+                    </a:solidFill>
+                  </a:tcPr>
+                </a:tc>
+                <a:tc>
+                  <a:txBody>
+                    <a:bodyPr tIns="18288" bIns="18288" lIns="45720" rIns="45720"/>
+                    <a:lstStyle/>
+                    <a:p>
+                      <a:pPr>
+                        <a:defRPr sz="700">
+                          <a:latin typeface="Arial Narrow"/>
+                        </a:defRPr>
+                      </a:pPr>
+                      <a:r>
+                        <a:t>CASABLANCA</a:t>
+                      </a:r>
+                    </a:p>
+                  </a:txBody>
+                  <a:tcPr>
+                    <a:solidFill>
+                      <a:srgbClr val="F2F2F2"/>
+                    </a:solidFill>
+                  </a:tcPr>
+                </a:tc>
+                <a:tc>
+                  <a:txBody>
+                    <a:bodyPr tIns="18288" bIns="18288" lIns="45720" rIns="45720"/>
+                    <a:lstStyle/>
+                    <a:p>
+                      <a:pPr>
+                        <a:defRPr sz="700">
+                          <a:latin typeface="Arial Narrow"/>
+                        </a:defRPr>
+                      </a:pPr>
+                      <a:r>
+                        <a:t>Mohammadia</a:t>
+                      </a:r>
+                    </a:p>
+                  </a:txBody>
+                  <a:tcPr>
+                    <a:solidFill>
+                      <a:srgbClr val="F2F2F2"/>
+                    </a:solidFill>
+                  </a:tcPr>
+                </a:tc>
+                <a:tc>
+                  <a:txBody>
+                    <a:bodyPr tIns="18288" bIns="18288" lIns="45720" rIns="45720"/>
+                    <a:lstStyle/>
+                    <a:p>
+                      <a:pPr>
+                        <a:defRPr sz="700">
+                          <a:latin typeface="Arial Narrow"/>
+                        </a:defRPr>
+                      </a:pPr>
+                      <a:r>
+                        <a:t>33.689684,-7.387657</a:t>
+                      </a:r>
+                    </a:p>
+                  </a:txBody>
+                  <a:tcPr>
+                    <a:solidFill>
+                      <a:srgbClr val="F2F2F2"/>
+                    </a:solidFill>
+                  </a:tcPr>
+                </a:tc>
+                <a:tc>
+                  <a:txBody>
+                    <a:bodyPr tIns="18288" bIns="18288" lIns="45720" rIns="45720"/>
+                    <a:lstStyle/>
+                    <a:p>
+                      <a:pPr>
+                        <a:defRPr sz="700">
+                          <a:latin typeface="Arial Narrow"/>
+                        </a:defRPr>
+                      </a:pPr>
+                      <a:r>
+                        <a:t>33.6899172,-7.3879014</a:t>
+                      </a:r>
+                    </a:p>
+                  </a:txBody>
+                  <a:tcPr>
+                    <a:solidFill>
+                      <a:srgbClr val="F2F2F2"/>
+                    </a:solidFill>
+                  </a:tcPr>
+                </a:tc>
+              </a:tr>
+              <a:tr h="93600">
+                <a:tc>
+                  <a:txBody>
+                    <a:bodyPr tIns="18288" bIns="18288" lIns="45720" rIns="45720"/>
+                    <a:lstStyle/>
+                    <a:p>
+                      <a:pPr>
+                        <a:defRPr sz="700">
+                          <a:latin typeface="Arial Narrow"/>
+                        </a:defRPr>
+                      </a:pPr>
+                      <a:r>
+                        <a:t>MOH669</a:t>
+                      </a:r>
+                    </a:p>
+                  </a:txBody>
                   <a:tcPr/>
                 </a:tc>
                 <a:tc>
                   <a:txBody>
-                    <a:bodyPr/>
-                    <a:lstStyle/>
-                    <a:p/>
+                    <a:bodyPr tIns="18288" bIns="18288" lIns="45720" rIns="45720"/>
+                    <a:lstStyle/>
+                    <a:p>
+                      <a:pPr>
+                        <a:defRPr sz="700">
+                          <a:latin typeface="Arial Narrow"/>
+                        </a:defRPr>
+                      </a:pPr>
+                      <a:r>
+                        <a:t>VERNE</a:t>
+                      </a:r>
+                    </a:p>
                   </a:txBody>
                   <a:tcPr/>
                 </a:tc>
                 <a:tc>
                   <a:txBody>
-                    <a:bodyPr/>
-                    <a:lstStyle/>
-                    <a:p>
+                    <a:bodyPr tIns="18288" bIns="18288" lIns="45720" rIns="45720"/>
+                    <a:lstStyle/>
+                    <a:p>
+                      <a:pPr>
+                        <a:defRPr sz="700">
+                          <a:latin typeface="Arial Narrow"/>
+                        </a:defRPr>
+                      </a:pPr>
+                      <a:r>
+                        <a:t>0660127763 AZEDDINE</a:t>
+                      </a:r>
+                    </a:p>
+                  </a:txBody>
+                  <a:tcPr/>
+                </a:tc>
+                <a:tc>
+                  <a:txBody>
+                    <a:bodyPr tIns="18288" bIns="18288" lIns="45720" rIns="45720"/>
+                    <a:lstStyle/>
+                    <a:p>
+                      <a:pPr>
+                        <a:defRPr sz="700">
+                          <a:latin typeface="Arial Narrow"/>
+                        </a:defRPr>
+                      </a:pPr>
                       <a:r>
                         <a:t>CASABLANCA</a:t>
                       </a:r>
@@ -3494,9 +4280,14 @@
                 </a:tc>
                 <a:tc>
                   <a:txBody>
-                    <a:bodyPr/>
-                    <a:lstStyle/>
-                    <a:p>
+                    <a:bodyPr tIns="18288" bIns="18288" lIns="45720" rIns="45720"/>
+                    <a:lstStyle/>
+                    <a:p>
+                      <a:pPr>
+                        <a:defRPr sz="700">
+                          <a:latin typeface="Arial Narrow"/>
+                        </a:defRPr>
+                      </a:pPr>
                       <a:r>
                         <a:t>Mohammadia</a:t>
                       </a:r>
@@ -3506,11 +4297,16 @@
                 </a:tc>
                 <a:tc>
                   <a:txBody>
-                    <a:bodyPr/>
-                    <a:lstStyle/>
-                    <a:p>
-                      <a:r>
-                        <a:t>33.665175,-7.360709</a:t>
+                    <a:bodyPr tIns="18288" bIns="18288" lIns="45720" rIns="45720"/>
+                    <a:lstStyle/>
+                    <a:p>
+                      <a:pPr>
+                        <a:defRPr sz="700">
+                          <a:latin typeface="Arial Narrow"/>
+                        </a:defRPr>
+                      </a:pPr>
+                      <a:r>
+                        <a:t>33.6893889,-7.3709722</a:t>
                       </a:r>
                     </a:p>
                   </a:txBody>
@@ -3518,41 +4314,454 @@
                 </a:tc>
                 <a:tc>
                   <a:txBody>
-                    <a:bodyPr/>
-                    <a:lstStyle/>
-                    <a:p>
-                      <a:r>
-                        <a:t>33.663564,-7.366709</a:t>
+                    <a:bodyPr tIns="18288" bIns="18288" lIns="45720" rIns="45720"/>
+                    <a:lstStyle/>
+                    <a:p>
+                      <a:pPr>
+                        <a:defRPr sz="700">
+                          <a:latin typeface="Arial Narrow"/>
+                        </a:defRPr>
+                      </a:pPr>
+                      <a:r>
+                        <a:t>33.6909874,-7.3704778</a:t>
                       </a:r>
                     </a:p>
                   </a:txBody>
                   <a:tcPr/>
                 </a:tc>
-                <a:tc>
-                  <a:txBody>
-                    <a:bodyPr/>
-                    <a:lstStyle/>
-                    <a:p/>
+              </a:tr>
+              <a:tr h="93600">
+                <a:tc>
+                  <a:txBody>
+                    <a:bodyPr tIns="18288" bIns="18288" lIns="45720" rIns="45720"/>
+                    <a:lstStyle/>
+                    <a:p>
+                      <a:pPr>
+                        <a:defRPr sz="700">
+                          <a:latin typeface="Arial Narrow"/>
+                        </a:defRPr>
+                      </a:pPr>
+                      <a:r>
+                        <a:t>MOH715</a:t>
+                      </a:r>
+                    </a:p>
+                  </a:txBody>
+                  <a:tcPr>
+                    <a:solidFill>
+                      <a:srgbClr val="F2F2F2"/>
+                    </a:solidFill>
+                  </a:tcPr>
+                </a:tc>
+                <a:tc>
+                  <a:txBody>
+                    <a:bodyPr tIns="18288" bIns="18288" lIns="45720" rIns="45720"/>
+                    <a:lstStyle/>
+                    <a:p>
+                      <a:pPr>
+                        <a:defRPr sz="700">
+                          <a:latin typeface="Arial Narrow"/>
+                        </a:defRPr>
+                      </a:pPr>
+                      <a:r>
+                        <a:t>VERNE</a:t>
+                      </a:r>
+                    </a:p>
+                  </a:txBody>
+                  <a:tcPr>
+                    <a:solidFill>
+                      <a:srgbClr val="F2F2F2"/>
+                    </a:solidFill>
+                  </a:tcPr>
+                </a:tc>
+                <a:tc>
+                  <a:txBody>
+                    <a:bodyPr tIns="18288" bIns="18288" lIns="45720" rIns="45720"/>
+                    <a:lstStyle/>
+                    <a:p>
+                      <a:pPr>
+                        <a:defRPr sz="700">
+                          <a:latin typeface="Arial Narrow"/>
+                        </a:defRPr>
+                      </a:pPr>
+                      <a:r>
+                        <a:t>0660127763 AZEDDINE</a:t>
+                      </a:r>
+                    </a:p>
+                  </a:txBody>
+                  <a:tcPr>
+                    <a:solidFill>
+                      <a:srgbClr val="F2F2F2"/>
+                    </a:solidFill>
+                  </a:tcPr>
+                </a:tc>
+                <a:tc>
+                  <a:txBody>
+                    <a:bodyPr tIns="18288" bIns="18288" lIns="45720" rIns="45720"/>
+                    <a:lstStyle/>
+                    <a:p>
+                      <a:pPr>
+                        <a:defRPr sz="700">
+                          <a:latin typeface="Arial Narrow"/>
+                        </a:defRPr>
+                      </a:pPr>
+                      <a:r>
+                        <a:t>CASABLANCA</a:t>
+                      </a:r>
+                    </a:p>
+                  </a:txBody>
+                  <a:tcPr>
+                    <a:solidFill>
+                      <a:srgbClr val="F2F2F2"/>
+                    </a:solidFill>
+                  </a:tcPr>
+                </a:tc>
+                <a:tc>
+                  <a:txBody>
+                    <a:bodyPr tIns="18288" bIns="18288" lIns="45720" rIns="45720"/>
+                    <a:lstStyle/>
+                    <a:p>
+                      <a:pPr>
+                        <a:defRPr sz="700">
+                          <a:latin typeface="Arial Narrow"/>
+                        </a:defRPr>
+                      </a:pPr>
+                      <a:r>
+                        <a:t>Mohammadia</a:t>
+                      </a:r>
+                    </a:p>
+                  </a:txBody>
+                  <a:tcPr>
+                    <a:solidFill>
+                      <a:srgbClr val="F2F2F2"/>
+                    </a:solidFill>
+                  </a:tcPr>
+                </a:tc>
+                <a:tc>
+                  <a:txBody>
+                    <a:bodyPr tIns="18288" bIns="18288" lIns="45720" rIns="45720"/>
+                    <a:lstStyle/>
+                    <a:p>
+                      <a:pPr>
+                        <a:defRPr sz="700">
+                          <a:latin typeface="Arial Narrow"/>
+                        </a:defRPr>
+                      </a:pPr>
+                      <a:r>
+                        <a:t>33.696611,-7.377861</a:t>
+                      </a:r>
+                    </a:p>
+                  </a:txBody>
+                  <a:tcPr>
+                    <a:solidFill>
+                      <a:srgbClr val="F2F2F2"/>
+                    </a:solidFill>
+                  </a:tcPr>
+                </a:tc>
+                <a:tc>
+                  <a:txBody>
+                    <a:bodyPr tIns="18288" bIns="18288" lIns="45720" rIns="45720"/>
+                    <a:lstStyle/>
+                    <a:p>
+                      <a:pPr>
+                        <a:defRPr sz="700">
+                          <a:latin typeface="Arial Narrow"/>
+                        </a:defRPr>
+                      </a:pPr>
+                      <a:r>
+                        <a:t>33.694875,-7.375636</a:t>
+                      </a:r>
+                    </a:p>
+                  </a:txBody>
+                  <a:tcPr>
+                    <a:solidFill>
+                      <a:srgbClr val="F2F2F2"/>
+                    </a:solidFill>
+                  </a:tcPr>
+                </a:tc>
+              </a:tr>
+              <a:tr h="93600">
+                <a:tc>
+                  <a:txBody>
+                    <a:bodyPr tIns="18288" bIns="18288" lIns="45720" rIns="45720"/>
+                    <a:lstStyle/>
+                    <a:p>
+                      <a:pPr>
+                        <a:defRPr sz="700">
+                          <a:latin typeface="Arial Narrow"/>
+                        </a:defRPr>
+                      </a:pPr>
+                      <a:r>
+                        <a:t>MOH629</a:t>
+                      </a:r>
+                    </a:p>
                   </a:txBody>
                   <a:tcPr/>
                 </a:tc>
                 <a:tc>
                   <a:txBody>
-                    <a:bodyPr/>
-                    <a:lstStyle/>
-                    <a:p/>
+                    <a:bodyPr tIns="18288" bIns="18288" lIns="45720" rIns="45720"/>
+                    <a:lstStyle/>
+                    <a:p>
+                      <a:pPr>
+                        <a:defRPr sz="700">
+                          <a:latin typeface="Arial Narrow"/>
+                        </a:defRPr>
+                      </a:pPr>
+                      <a:r>
+                        <a:t>VERNE</a:t>
+                      </a:r>
+                    </a:p>
                   </a:txBody>
                   <a:tcPr/>
                 </a:tc>
+                <a:tc>
+                  <a:txBody>
+                    <a:bodyPr tIns="18288" bIns="18288" lIns="45720" rIns="45720"/>
+                    <a:lstStyle/>
+                    <a:p>
+                      <a:pPr>
+                        <a:defRPr sz="700">
+                          <a:latin typeface="Arial Narrow"/>
+                        </a:defRPr>
+                      </a:pPr>
+                      <a:r>
+                        <a:t>0660127763 AZEDDINE</a:t>
+                      </a:r>
+                    </a:p>
+                  </a:txBody>
+                  <a:tcPr/>
+                </a:tc>
+                <a:tc>
+                  <a:txBody>
+                    <a:bodyPr tIns="18288" bIns="18288" lIns="45720" rIns="45720"/>
+                    <a:lstStyle/>
+                    <a:p>
+                      <a:pPr>
+                        <a:defRPr sz="700">
+                          <a:latin typeface="Arial Narrow"/>
+                        </a:defRPr>
+                      </a:pPr>
+                      <a:r>
+                        <a:t>CASABLANCA</a:t>
+                      </a:r>
+                    </a:p>
+                  </a:txBody>
+                  <a:tcPr/>
+                </a:tc>
+                <a:tc>
+                  <a:txBody>
+                    <a:bodyPr tIns="18288" bIns="18288" lIns="45720" rIns="45720"/>
+                    <a:lstStyle/>
+                    <a:p>
+                      <a:pPr>
+                        <a:defRPr sz="700">
+                          <a:latin typeface="Arial Narrow"/>
+                        </a:defRPr>
+                      </a:pPr>
+                      <a:r>
+                        <a:t>Mohammadia</a:t>
+                      </a:r>
+                    </a:p>
+                  </a:txBody>
+                  <a:tcPr/>
+                </a:tc>
+                <a:tc>
+                  <a:txBody>
+                    <a:bodyPr tIns="18288" bIns="18288" lIns="45720" rIns="45720"/>
+                    <a:lstStyle/>
+                    <a:p>
+                      <a:pPr>
+                        <a:defRPr sz="700">
+                          <a:latin typeface="Arial Narrow"/>
+                        </a:defRPr>
+                      </a:pPr>
+                      <a:r>
+                        <a:t>33.694361,-7.362472</a:t>
+                      </a:r>
+                    </a:p>
+                  </a:txBody>
+                  <a:tcPr/>
+                </a:tc>
+                <a:tc>
+                  <a:txBody>
+                    <a:bodyPr tIns="18288" bIns="18288" lIns="45720" rIns="45720"/>
+                    <a:lstStyle/>
+                    <a:p>
+                      <a:pPr>
+                        <a:defRPr sz="700">
+                          <a:latin typeface="Arial Narrow"/>
+                        </a:defRPr>
+                      </a:pPr>
+                      <a:r>
+                        <a:t>33.696719,-7.366903</a:t>
+                      </a:r>
+                    </a:p>
+                  </a:txBody>
+                  <a:tcPr/>
+                </a:tc>
               </a:tr>
-              <a:tr h="285750">
-                <a:tc>
-                  <a:txBody>
-                    <a:bodyPr/>
-                    <a:lstStyle/>
-                    <a:p>
-                      <a:r>
-                        <a:t>MOH694</a:t>
+              <a:tr h="93600">
+                <a:tc>
+                  <a:txBody>
+                    <a:bodyPr tIns="18288" bIns="18288" lIns="45720" rIns="45720"/>
+                    <a:lstStyle/>
+                    <a:p>
+                      <a:pPr>
+                        <a:defRPr sz="700">
+                          <a:latin typeface="Arial Narrow"/>
+                        </a:defRPr>
+                      </a:pPr>
+                      <a:r>
+                        <a:t>MOH704</a:t>
+                      </a:r>
+                    </a:p>
+                  </a:txBody>
+                  <a:tcPr>
+                    <a:solidFill>
+                      <a:srgbClr val="F2F2F2"/>
+                    </a:solidFill>
+                  </a:tcPr>
+                </a:tc>
+                <a:tc>
+                  <a:txBody>
+                    <a:bodyPr tIns="18288" bIns="18288" lIns="45720" rIns="45720"/>
+                    <a:lstStyle/>
+                    <a:p>
+                      <a:pPr>
+                        <a:defRPr sz="700">
+                          <a:latin typeface="Arial Narrow"/>
+                        </a:defRPr>
+                      </a:pPr>
+                      <a:r>
+                        <a:t>VERNE</a:t>
+                      </a:r>
+                    </a:p>
+                  </a:txBody>
+                  <a:tcPr>
+                    <a:solidFill>
+                      <a:srgbClr val="F2F2F2"/>
+                    </a:solidFill>
+                  </a:tcPr>
+                </a:tc>
+                <a:tc>
+                  <a:txBody>
+                    <a:bodyPr tIns="18288" bIns="18288" lIns="45720" rIns="45720"/>
+                    <a:lstStyle/>
+                    <a:p>
+                      <a:pPr>
+                        <a:defRPr sz="700">
+                          <a:latin typeface="Arial Narrow"/>
+                        </a:defRPr>
+                      </a:pPr>
+                      <a:r>
+                        <a:t>0660127763 AZEDDINE</a:t>
+                      </a:r>
+                    </a:p>
+                  </a:txBody>
+                  <a:tcPr>
+                    <a:solidFill>
+                      <a:srgbClr val="F2F2F2"/>
+                    </a:solidFill>
+                  </a:tcPr>
+                </a:tc>
+                <a:tc>
+                  <a:txBody>
+                    <a:bodyPr tIns="18288" bIns="18288" lIns="45720" rIns="45720"/>
+                    <a:lstStyle/>
+                    <a:p>
+                      <a:pPr>
+                        <a:defRPr sz="700">
+                          <a:latin typeface="Arial Narrow"/>
+                        </a:defRPr>
+                      </a:pPr>
+                      <a:r>
+                        <a:t>CASABLANCA</a:t>
+                      </a:r>
+                    </a:p>
+                  </a:txBody>
+                  <a:tcPr>
+                    <a:solidFill>
+                      <a:srgbClr val="F2F2F2"/>
+                    </a:solidFill>
+                  </a:tcPr>
+                </a:tc>
+                <a:tc>
+                  <a:txBody>
+                    <a:bodyPr tIns="18288" bIns="18288" lIns="45720" rIns="45720"/>
+                    <a:lstStyle/>
+                    <a:p>
+                      <a:pPr>
+                        <a:defRPr sz="700">
+                          <a:latin typeface="Arial Narrow"/>
+                        </a:defRPr>
+                      </a:pPr>
+                      <a:r>
+                        <a:t>Mohammadia</a:t>
+                      </a:r>
+                    </a:p>
+                  </a:txBody>
+                  <a:tcPr>
+                    <a:solidFill>
+                      <a:srgbClr val="F2F2F2"/>
+                    </a:solidFill>
+                  </a:tcPr>
+                </a:tc>
+                <a:tc>
+                  <a:txBody>
+                    <a:bodyPr tIns="18288" bIns="18288" lIns="45720" rIns="45720"/>
+                    <a:lstStyle/>
+                    <a:p>
+                      <a:pPr>
+                        <a:defRPr sz="700">
+                          <a:latin typeface="Arial Narrow"/>
+                        </a:defRPr>
+                      </a:pPr>
+                      <a:r>
+                        <a:t>33.697836,-7.351515</a:t>
+                      </a:r>
+                    </a:p>
+                  </a:txBody>
+                  <a:tcPr>
+                    <a:solidFill>
+                      <a:srgbClr val="F2F2F2"/>
+                    </a:solidFill>
+                  </a:tcPr>
+                </a:tc>
+                <a:tc>
+                  <a:txBody>
+                    <a:bodyPr tIns="18288" bIns="18288" lIns="45720" rIns="45720"/>
+                    <a:lstStyle/>
+                    <a:p>
+                      <a:pPr>
+                        <a:defRPr sz="700">
+                          <a:latin typeface="Arial Narrow"/>
+                        </a:defRPr>
+                      </a:pPr>
+                      <a:r>
+                        <a:t>33.698122,-7.358454</a:t>
+                      </a:r>
+                    </a:p>
+                  </a:txBody>
+                  <a:tcPr>
+                    <a:solidFill>
+                      <a:srgbClr val="F2F2F2"/>
+                    </a:solidFill>
+                  </a:tcPr>
+                </a:tc>
+              </a:tr>
+              <a:tr h="93600">
+                <a:tc>
+                  <a:txBody>
+                    <a:bodyPr tIns="18288" bIns="18288" lIns="45720" rIns="45720"/>
+                    <a:lstStyle/>
+                    <a:p>
+                      <a:pPr>
+                        <a:defRPr sz="700">
+                          <a:latin typeface="Arial Narrow"/>
+                        </a:defRPr>
+                      </a:pPr>
+                      <a:r>
+                        <a:t>MOH685</a:t>
                       </a:r>
                     </a:p>
                   </a:txBody>
@@ -3560,9 +4769,14 @@
                 </a:tc>
                 <a:tc>
                   <a:txBody>
-                    <a:bodyPr/>
-                    <a:lstStyle/>
-                    <a:p>
+                    <a:bodyPr tIns="18288" bIns="18288" lIns="45720" rIns="45720"/>
+                    <a:lstStyle/>
+                    <a:p>
+                      <a:pPr>
+                        <a:defRPr sz="700">
+                          <a:latin typeface="Arial Narrow"/>
+                        </a:defRPr>
+                      </a:pPr>
                       <a:r>
                         <a:t>VERNE</a:t>
                       </a:r>
@@ -3572,11 +4786,16 @@
                 </a:tc>
                 <a:tc>
                   <a:txBody>
-                    <a:bodyPr/>
-                    <a:lstStyle/>
-                    <a:p>
-                      <a:r>
-                        <a:t>JUIN</a:t>
+                    <a:bodyPr tIns="18288" bIns="18288" lIns="45720" rIns="45720"/>
+                    <a:lstStyle/>
+                    <a:p>
+                      <a:pPr>
+                        <a:defRPr sz="700">
+                          <a:latin typeface="Arial Narrow"/>
+                        </a:defRPr>
+                      </a:pPr>
+                      <a:r>
+                        <a:t>0660127763 AZEDDINE</a:t>
                       </a:r>
                     </a:p>
                   </a:txBody>
@@ -3584,11 +4803,16 @@
                 </a:tc>
                 <a:tc>
                   <a:txBody>
-                    <a:bodyPr/>
-                    <a:lstStyle/>
-                    <a:p>
-                      <a:r>
-                        <a:t>Du 01/06/2024 Au 31/09/2024</a:t>
+                    <a:bodyPr tIns="18288" bIns="18288" lIns="45720" rIns="45720"/>
+                    <a:lstStyle/>
+                    <a:p>
+                      <a:pPr>
+                        <a:defRPr sz="700">
+                          <a:latin typeface="Arial Narrow"/>
+                        </a:defRPr>
+                      </a:pPr>
+                      <a:r>
+                        <a:t>CASABLANCA</a:t>
                       </a:r>
                     </a:p>
                   </a:txBody>
@@ -3596,11 +4820,16 @@
                 </a:tc>
                 <a:tc>
                   <a:txBody>
-                    <a:bodyPr/>
-                    <a:lstStyle/>
-                    <a:p>
-                      <a:r>
-                        <a:t>Du 01/06/2024 Au 31/09/2024</a:t>
+                    <a:bodyPr tIns="18288" bIns="18288" lIns="45720" rIns="45720"/>
+                    <a:lstStyle/>
+                    <a:p>
+                      <a:pPr>
+                        <a:defRPr sz="700">
+                          <a:latin typeface="Arial Narrow"/>
+                        </a:defRPr>
+                      </a:pPr>
+                      <a:r>
+                        <a:t>Mohammadia</a:t>
                       </a:r>
                     </a:p>
                   </a:txBody>
@@ -3608,37 +4837,250 @@
                 </a:tc>
                 <a:tc>
                   <a:txBody>
-                    <a:bodyPr/>
-                    <a:lstStyle/>
-                    <a:p/>
+                    <a:bodyPr tIns="18288" bIns="18288" lIns="45720" rIns="45720"/>
+                    <a:lstStyle/>
+                    <a:p>
+                      <a:pPr>
+                        <a:defRPr sz="700">
+                          <a:latin typeface="Arial Narrow"/>
+                        </a:defRPr>
+                      </a:pPr>
+                      <a:r>
+                        <a:t>33.69817,-7.400306</a:t>
+                      </a:r>
+                    </a:p>
                   </a:txBody>
                   <a:tcPr/>
                 </a:tc>
                 <a:tc>
                   <a:txBody>
-                    <a:bodyPr/>
-                    <a:lstStyle/>
-                    <a:p>
+                    <a:bodyPr tIns="18288" bIns="18288" lIns="45720" rIns="45720"/>
+                    <a:lstStyle/>
+                    <a:p>
+                      <a:pPr>
+                        <a:defRPr sz="700">
+                          <a:latin typeface="Arial Narrow"/>
+                        </a:defRPr>
+                      </a:pPr>
+                      <a:r>
+                        <a:t>33.6986762,-7.3994109</a:t>
+                      </a:r>
+                    </a:p>
+                  </a:txBody>
+                  <a:tcPr/>
+                </a:tc>
+              </a:tr>
+              <a:tr h="93600">
+                <a:tc>
+                  <a:txBody>
+                    <a:bodyPr tIns="18288" bIns="18288" lIns="45720" rIns="45720"/>
+                    <a:lstStyle/>
+                    <a:p>
+                      <a:pPr>
+                        <a:defRPr sz="700">
+                          <a:latin typeface="Arial Narrow"/>
+                        </a:defRPr>
+                      </a:pPr>
+                      <a:r>
+                        <a:t>MOH710</a:t>
+                      </a:r>
+                    </a:p>
+                  </a:txBody>
+                  <a:tcPr>
+                    <a:solidFill>
+                      <a:srgbClr val="F2F2F2"/>
+                    </a:solidFill>
+                  </a:tcPr>
+                </a:tc>
+                <a:tc>
+                  <a:txBody>
+                    <a:bodyPr tIns="18288" bIns="18288" lIns="45720" rIns="45720"/>
+                    <a:lstStyle/>
+                    <a:p>
+                      <a:pPr>
+                        <a:defRPr sz="700">
+                          <a:latin typeface="Arial Narrow"/>
+                        </a:defRPr>
+                      </a:pPr>
+                      <a:r>
+                        <a:t>VERNE</a:t>
+                      </a:r>
+                    </a:p>
+                  </a:txBody>
+                  <a:tcPr>
+                    <a:solidFill>
+                      <a:srgbClr val="F2F2F2"/>
+                    </a:solidFill>
+                  </a:tcPr>
+                </a:tc>
+                <a:tc>
+                  <a:txBody>
+                    <a:bodyPr tIns="18288" bIns="18288" lIns="45720" rIns="45720"/>
+                    <a:lstStyle/>
+                    <a:p>
+                      <a:pPr>
+                        <a:defRPr sz="700">
+                          <a:latin typeface="Arial Narrow"/>
+                        </a:defRPr>
+                      </a:pPr>
                       <a:r>
                         <a:t>0660127763 AZEDDINE</a:t>
                       </a:r>
                     </a:p>
                   </a:txBody>
+                  <a:tcPr>
+                    <a:solidFill>
+                      <a:srgbClr val="F2F2F2"/>
+                    </a:solidFill>
+                  </a:tcPr>
+                </a:tc>
+                <a:tc>
+                  <a:txBody>
+                    <a:bodyPr tIns="18288" bIns="18288" lIns="45720" rIns="45720"/>
+                    <a:lstStyle/>
+                    <a:p>
+                      <a:pPr>
+                        <a:defRPr sz="700">
+                          <a:latin typeface="Arial Narrow"/>
+                        </a:defRPr>
+                      </a:pPr>
+                      <a:r>
+                        <a:t>CASABLANCA</a:t>
+                      </a:r>
+                    </a:p>
+                  </a:txBody>
+                  <a:tcPr>
+                    <a:solidFill>
+                      <a:srgbClr val="F2F2F2"/>
+                    </a:solidFill>
+                  </a:tcPr>
+                </a:tc>
+                <a:tc>
+                  <a:txBody>
+                    <a:bodyPr tIns="18288" bIns="18288" lIns="45720" rIns="45720"/>
+                    <a:lstStyle/>
+                    <a:p>
+                      <a:pPr>
+                        <a:defRPr sz="700">
+                          <a:latin typeface="Arial Narrow"/>
+                        </a:defRPr>
+                      </a:pPr>
+                      <a:r>
+                        <a:t>Mohammadia</a:t>
+                      </a:r>
+                    </a:p>
+                  </a:txBody>
+                  <a:tcPr>
+                    <a:solidFill>
+                      <a:srgbClr val="F2F2F2"/>
+                    </a:solidFill>
+                  </a:tcPr>
+                </a:tc>
+                <a:tc>
+                  <a:txBody>
+                    <a:bodyPr tIns="18288" bIns="18288" lIns="45720" rIns="45720"/>
+                    <a:lstStyle/>
+                    <a:p>
+                      <a:pPr>
+                        <a:defRPr sz="700">
+                          <a:latin typeface="Arial Narrow"/>
+                        </a:defRPr>
+                      </a:pPr>
+                      <a:r>
+                        <a:t>33.7025,-7.363889</a:t>
+                      </a:r>
+                    </a:p>
+                  </a:txBody>
+                  <a:tcPr>
+                    <a:solidFill>
+                      <a:srgbClr val="F2F2F2"/>
+                    </a:solidFill>
+                  </a:tcPr>
+                </a:tc>
+                <a:tc>
+                  <a:txBody>
+                    <a:bodyPr tIns="18288" bIns="18288" lIns="45720" rIns="45720"/>
+                    <a:lstStyle/>
+                    <a:p>
+                      <a:pPr>
+                        <a:defRPr sz="700">
+                          <a:latin typeface="Arial Narrow"/>
+                        </a:defRPr>
+                      </a:pPr>
+                      <a:r>
+                        <a:t>33.7006971,-7.3624697</a:t>
+                      </a:r>
+                    </a:p>
+                  </a:txBody>
+                  <a:tcPr>
+                    <a:solidFill>
+                      <a:srgbClr val="F2F2F2"/>
+                    </a:solidFill>
+                  </a:tcPr>
+                </a:tc>
+              </a:tr>
+              <a:tr h="93600">
+                <a:tc>
+                  <a:txBody>
+                    <a:bodyPr tIns="18288" bIns="18288" lIns="45720" rIns="45720"/>
+                    <a:lstStyle/>
+                    <a:p>
+                      <a:pPr>
+                        <a:defRPr sz="700">
+                          <a:latin typeface="Arial Narrow"/>
+                        </a:defRPr>
+                      </a:pPr>
+                      <a:r>
+                        <a:t>MOH711</a:t>
+                      </a:r>
+                    </a:p>
+                  </a:txBody>
                   <a:tcPr/>
                 </a:tc>
                 <a:tc>
                   <a:txBody>
-                    <a:bodyPr/>
-                    <a:lstStyle/>
-                    <a:p/>
+                    <a:bodyPr tIns="18288" bIns="18288" lIns="45720" rIns="45720"/>
+                    <a:lstStyle/>
+                    <a:p>
+                      <a:pPr>
+                        <a:defRPr sz="700">
+                          <a:latin typeface="Arial Narrow"/>
+                        </a:defRPr>
+                      </a:pPr>
+                      <a:r>
+                        <a:t>VERNE</a:t>
+                      </a:r>
+                    </a:p>
                   </a:txBody>
                   <a:tcPr/>
                 </a:tc>
                 <a:tc>
                   <a:txBody>
-                    <a:bodyPr/>
-                    <a:lstStyle/>
-                    <a:p>
+                    <a:bodyPr tIns="18288" bIns="18288" lIns="45720" rIns="45720"/>
+                    <a:lstStyle/>
+                    <a:p>
+                      <a:pPr>
+                        <a:defRPr sz="700">
+                          <a:latin typeface="Arial Narrow"/>
+                        </a:defRPr>
+                      </a:pPr>
+                      <a:r>
+                        <a:t>0660127763 AZEDDINE</a:t>
+                      </a:r>
+                    </a:p>
+                  </a:txBody>
+                  <a:tcPr/>
+                </a:tc>
+                <a:tc>
+                  <a:txBody>
+                    <a:bodyPr tIns="18288" bIns="18288" lIns="45720" rIns="45720"/>
+                    <a:lstStyle/>
+                    <a:p>
+                      <a:pPr>
+                        <a:defRPr sz="700">
+                          <a:latin typeface="Arial Narrow"/>
+                        </a:defRPr>
+                      </a:pPr>
                       <a:r>
                         <a:t>CASABLANCA</a:t>
                       </a:r>
@@ -3648,9 +5090,14 @@
                 </a:tc>
                 <a:tc>
                   <a:txBody>
-                    <a:bodyPr/>
-                    <a:lstStyle/>
-                    <a:p>
+                    <a:bodyPr tIns="18288" bIns="18288" lIns="45720" rIns="45720"/>
+                    <a:lstStyle/>
+                    <a:p>
+                      <a:pPr>
+                        <a:defRPr sz="700">
+                          <a:latin typeface="Arial Narrow"/>
+                        </a:defRPr>
+                      </a:pPr>
                       <a:r>
                         <a:t>Mohammadia</a:t>
                       </a:r>
@@ -3660,11 +5107,16 @@
                 </a:tc>
                 <a:tc>
                   <a:txBody>
-                    <a:bodyPr/>
-                    <a:lstStyle/>
-                    <a:p>
-                      <a:r>
-                        <a:t>33.6630278,-7.4139166</a:t>
+                    <a:bodyPr tIns="18288" bIns="18288" lIns="45720" rIns="45720"/>
+                    <a:lstStyle/>
+                    <a:p>
+                      <a:pPr>
+                        <a:defRPr sz="700">
+                          <a:latin typeface="Arial Narrow"/>
+                        </a:defRPr>
+                      </a:pPr>
+                      <a:r>
+                        <a:t>33.700556,-7.357389</a:t>
                       </a:r>
                     </a:p>
                   </a:txBody>
@@ -3672,41 +5124,218 @@
                 </a:tc>
                 <a:tc>
                   <a:txBody>
-                    <a:bodyPr/>
-                    <a:lstStyle/>
-                    <a:p>
-                      <a:r>
-                        <a:t>33.665219,-7.411335</a:t>
+                    <a:bodyPr tIns="18288" bIns="18288" lIns="45720" rIns="45720"/>
+                    <a:lstStyle/>
+                    <a:p>
+                      <a:pPr>
+                        <a:defRPr sz="700">
+                          <a:latin typeface="Arial Narrow"/>
+                        </a:defRPr>
+                      </a:pPr>
+                      <a:r>
+                        <a:t>33.701973,-7.360872</a:t>
                       </a:r>
                     </a:p>
                   </a:txBody>
                   <a:tcPr/>
                 </a:tc>
-                <a:tc>
-                  <a:txBody>
-                    <a:bodyPr/>
-                    <a:lstStyle/>
-                    <a:p/>
+              </a:tr>
+              <a:tr h="93600">
+                <a:tc>
+                  <a:txBody>
+                    <a:bodyPr tIns="18288" bIns="18288" lIns="45720" rIns="45720"/>
+                    <a:lstStyle/>
+                    <a:p>
+                      <a:pPr>
+                        <a:defRPr sz="700">
+                          <a:latin typeface="Arial Narrow"/>
+                        </a:defRPr>
+                      </a:pPr>
+                      <a:r>
+                        <a:t>MOH635</a:t>
+                      </a:r>
+                    </a:p>
+                  </a:txBody>
+                  <a:tcPr>
+                    <a:solidFill>
+                      <a:srgbClr val="F2F2F2"/>
+                    </a:solidFill>
+                  </a:tcPr>
+                </a:tc>
+                <a:tc>
+                  <a:txBody>
+                    <a:bodyPr tIns="18288" bIns="18288" lIns="45720" rIns="45720"/>
+                    <a:lstStyle/>
+                    <a:p>
+                      <a:pPr>
+                        <a:defRPr sz="700">
+                          <a:latin typeface="Arial Narrow"/>
+                        </a:defRPr>
+                      </a:pPr>
+                      <a:r>
+                        <a:t>VERNE</a:t>
+                      </a:r>
+                    </a:p>
+                  </a:txBody>
+                  <a:tcPr>
+                    <a:solidFill>
+                      <a:srgbClr val="F2F2F2"/>
+                    </a:solidFill>
+                  </a:tcPr>
+                </a:tc>
+                <a:tc>
+                  <a:txBody>
+                    <a:bodyPr tIns="18288" bIns="18288" lIns="45720" rIns="45720"/>
+                    <a:lstStyle/>
+                    <a:p>
+                      <a:pPr>
+                        <a:defRPr sz="700">
+                          <a:latin typeface="Arial Narrow"/>
+                        </a:defRPr>
+                      </a:pPr>
+                      <a:r>
+                        <a:t>0660127763 AZEDDINE</a:t>
+                      </a:r>
+                    </a:p>
+                  </a:txBody>
+                  <a:tcPr>
+                    <a:solidFill>
+                      <a:srgbClr val="F2F2F2"/>
+                    </a:solidFill>
+                  </a:tcPr>
+                </a:tc>
+                <a:tc>
+                  <a:txBody>
+                    <a:bodyPr tIns="18288" bIns="18288" lIns="45720" rIns="45720"/>
+                    <a:lstStyle/>
+                    <a:p>
+                      <a:pPr>
+                        <a:defRPr sz="700">
+                          <a:latin typeface="Arial Narrow"/>
+                        </a:defRPr>
+                      </a:pPr>
+                      <a:r>
+                        <a:t>CASABLANCA</a:t>
+                      </a:r>
+                    </a:p>
+                  </a:txBody>
+                  <a:tcPr>
+                    <a:solidFill>
+                      <a:srgbClr val="F2F2F2"/>
+                    </a:solidFill>
+                  </a:tcPr>
+                </a:tc>
+                <a:tc>
+                  <a:txBody>
+                    <a:bodyPr tIns="18288" bIns="18288" lIns="45720" rIns="45720"/>
+                    <a:lstStyle/>
+                    <a:p>
+                      <a:pPr>
+                        <a:defRPr sz="700">
+                          <a:latin typeface="Arial Narrow"/>
+                        </a:defRPr>
+                      </a:pPr>
+                      <a:r>
+                        <a:t>Mohammadia</a:t>
+                      </a:r>
+                    </a:p>
+                  </a:txBody>
+                  <a:tcPr>
+                    <a:solidFill>
+                      <a:srgbClr val="F2F2F2"/>
+                    </a:solidFill>
+                  </a:tcPr>
+                </a:tc>
+                <a:tc>
+                  <a:txBody>
+                    <a:bodyPr tIns="18288" bIns="18288" lIns="45720" rIns="45720"/>
+                    <a:lstStyle/>
+                    <a:p>
+                      <a:pPr>
+                        <a:defRPr sz="700">
+                          <a:latin typeface="Arial Narrow"/>
+                        </a:defRPr>
+                      </a:pPr>
+                      <a:r>
+                        <a:t>33.7081389,-7.3609167</a:t>
+                      </a:r>
+                    </a:p>
+                  </a:txBody>
+                  <a:tcPr>
+                    <a:solidFill>
+                      <a:srgbClr val="F2F2F2"/>
+                    </a:solidFill>
+                  </a:tcPr>
+                </a:tc>
+                <a:tc>
+                  <a:txBody>
+                    <a:bodyPr tIns="18288" bIns="18288" lIns="45720" rIns="45720"/>
+                    <a:lstStyle/>
+                    <a:p>
+                      <a:pPr>
+                        <a:defRPr sz="700">
+                          <a:latin typeface="Arial Narrow"/>
+                        </a:defRPr>
+                      </a:pPr>
+                      <a:r>
+                        <a:t>33.705190,-7.357872</a:t>
+                      </a:r>
+                    </a:p>
+                  </a:txBody>
+                  <a:tcPr>
+                    <a:solidFill>
+                      <a:srgbClr val="F2F2F2"/>
+                    </a:solidFill>
+                  </a:tcPr>
+                </a:tc>
+              </a:tr>
+              <a:tr h="93600">
+                <a:tc>
+                  <a:txBody>
+                    <a:bodyPr tIns="18288" bIns="18288" lIns="45720" rIns="45720"/>
+                    <a:lstStyle/>
+                    <a:p>
+                      <a:pPr>
+                        <a:defRPr sz="700">
+                          <a:latin typeface="Arial Narrow"/>
+                        </a:defRPr>
+                      </a:pPr>
+                      <a:r>
+                        <a:t>MOH650</a:t>
+                      </a:r>
+                    </a:p>
                   </a:txBody>
                   <a:tcPr/>
                 </a:tc>
                 <a:tc>
                   <a:txBody>
-                    <a:bodyPr/>
-                    <a:lstStyle/>
-                    <a:p/>
+                    <a:bodyPr tIns="18288" bIns="18288" lIns="45720" rIns="45720"/>
+                    <a:lstStyle/>
+                    <a:p>
+                      <a:pPr>
+                        <a:defRPr sz="700">
+                          <a:latin typeface="Arial Narrow"/>
+                        </a:defRPr>
+                      </a:pPr>
+                      <a:r>
+                        <a:t>VERNE</a:t>
+                      </a:r>
+                    </a:p>
                   </a:txBody>
                   <a:tcPr/>
                 </a:tc>
-              </a:tr>
-              <a:tr h="285750">
-                <a:tc>
-                  <a:txBody>
-                    <a:bodyPr/>
-                    <a:lstStyle/>
-                    <a:p>
-                      <a:r>
-                        <a:t>MOH705</a:t>
+                <a:tc>
+                  <a:txBody>
+                    <a:bodyPr tIns="18288" bIns="18288" lIns="45720" rIns="45720"/>
+                    <a:lstStyle/>
+                    <a:p>
+                      <a:pPr>
+                        <a:defRPr sz="700">
+                          <a:latin typeface="Arial Narrow"/>
+                        </a:defRPr>
+                      </a:pPr>
+                      <a:r>
+                        <a:t>0660127763 AZEDDINE</a:t>
                       </a:r>
                     </a:p>
                   </a:txBody>
@@ -3714,11 +5343,16 @@
                 </a:tc>
                 <a:tc>
                   <a:txBody>
-                    <a:bodyPr/>
-                    <a:lstStyle/>
-                    <a:p>
-                      <a:r>
-                        <a:t>VERNE</a:t>
+                    <a:bodyPr tIns="18288" bIns="18288" lIns="45720" rIns="45720"/>
+                    <a:lstStyle/>
+                    <a:p>
+                      <a:pPr>
+                        <a:defRPr sz="700">
+                          <a:latin typeface="Arial Narrow"/>
+                        </a:defRPr>
+                      </a:pPr>
+                      <a:r>
+                        <a:t>CASABLANCA</a:t>
                       </a:r>
                     </a:p>
                   </a:txBody>
@@ -3726,11 +5360,16 @@
                 </a:tc>
                 <a:tc>
                   <a:txBody>
-                    <a:bodyPr/>
-                    <a:lstStyle/>
-                    <a:p>
-                      <a:r>
-                        <a:t>JUIN</a:t>
+                    <a:bodyPr tIns="18288" bIns="18288" lIns="45720" rIns="45720"/>
+                    <a:lstStyle/>
+                    <a:p>
+                      <a:pPr>
+                        <a:defRPr sz="700">
+                          <a:latin typeface="Arial Narrow"/>
+                        </a:defRPr>
+                      </a:pPr>
+                      <a:r>
+                        <a:t>Mohammadia</a:t>
                       </a:r>
                     </a:p>
                   </a:txBody>
@@ -3738,11 +5377,16 @@
                 </a:tc>
                 <a:tc>
                   <a:txBody>
-                    <a:bodyPr/>
-                    <a:lstStyle/>
-                    <a:p>
-                      <a:r>
-                        <a:t>Du 01/06/2024 Au 31/09/2024</a:t>
+                    <a:bodyPr tIns="18288" bIns="18288" lIns="45720" rIns="45720"/>
+                    <a:lstStyle/>
+                    <a:p>
+                      <a:pPr>
+                        <a:defRPr sz="700">
+                          <a:latin typeface="Arial Narrow"/>
+                        </a:defRPr>
+                      </a:pPr>
+                      <a:r>
+                        <a:t>33.708944,-7.40175</a:t>
                       </a:r>
                     </a:p>
                   </a:txBody>
@@ -3750,1953 +5394,18 @@
                 </a:tc>
                 <a:tc>
                   <a:txBody>
-                    <a:bodyPr/>
-                    <a:lstStyle/>
-                    <a:p>
-                      <a:r>
-                        <a:t>Du 01/06/2024 Au 31/09/2024</a:t>
-                      </a:r>
-                    </a:p>
-                  </a:txBody>
-                  <a:tcPr/>
-                </a:tc>
-                <a:tc>
-                  <a:txBody>
-                    <a:bodyPr/>
-                    <a:lstStyle/>
-                    <a:p/>
-                  </a:txBody>
-                  <a:tcPr/>
-                </a:tc>
-                <a:tc>
-                  <a:txBody>
-                    <a:bodyPr/>
-                    <a:lstStyle/>
-                    <a:p>
-                      <a:r>
-                        <a:t>0660127763 AZEDDINE</a:t>
-                      </a:r>
-                    </a:p>
-                  </a:txBody>
-                  <a:tcPr/>
-                </a:tc>
-                <a:tc>
-                  <a:txBody>
-                    <a:bodyPr/>
-                    <a:lstStyle/>
-                    <a:p/>
-                  </a:txBody>
-                  <a:tcPr/>
-                </a:tc>
-                <a:tc>
-                  <a:txBody>
-                    <a:bodyPr/>
-                    <a:lstStyle/>
-                    <a:p>
-                      <a:r>
-                        <a:t>CASABLANCA</a:t>
-                      </a:r>
-                    </a:p>
-                  </a:txBody>
-                  <a:tcPr/>
-                </a:tc>
-                <a:tc>
-                  <a:txBody>
-                    <a:bodyPr/>
-                    <a:lstStyle/>
-                    <a:p>
-                      <a:r>
-                        <a:t>Mohammadia</a:t>
-                      </a:r>
-                    </a:p>
-                  </a:txBody>
-                  <a:tcPr/>
-                </a:tc>
-                <a:tc>
-                  <a:txBody>
-                    <a:bodyPr/>
-                    <a:lstStyle/>
-                    <a:p>
-                      <a:r>
-                        <a:t>33.678323,-7.391892</a:t>
-                      </a:r>
-                    </a:p>
-                  </a:txBody>
-                  <a:tcPr/>
-                </a:tc>
-                <a:tc>
-                  <a:txBody>
-                    <a:bodyPr/>
-                    <a:lstStyle/>
-                    <a:p>
-                      <a:r>
-                        <a:t>33.6785160,-7.3921373</a:t>
-                      </a:r>
-                    </a:p>
-                  </a:txBody>
-                  <a:tcPr/>
-                </a:tc>
-                <a:tc>
-                  <a:txBody>
-                    <a:bodyPr/>
-                    <a:lstStyle/>
-                    <a:p/>
-                  </a:txBody>
-                  <a:tcPr/>
-                </a:tc>
-                <a:tc>
-                  <a:txBody>
-                    <a:bodyPr/>
-                    <a:lstStyle/>
-                    <a:p/>
-                  </a:txBody>
-                  <a:tcPr/>
-                </a:tc>
-              </a:tr>
-              <a:tr h="285750">
-                <a:tc>
-                  <a:txBody>
-                    <a:bodyPr/>
-                    <a:lstStyle/>
-                    <a:p>
-                      <a:r>
-                        <a:t>MOH709</a:t>
-                      </a:r>
-                    </a:p>
-                  </a:txBody>
-                  <a:tcPr/>
-                </a:tc>
-                <a:tc>
-                  <a:txBody>
-                    <a:bodyPr/>
-                    <a:lstStyle/>
-                    <a:p>
-                      <a:r>
-                        <a:t>VERNE</a:t>
-                      </a:r>
-                    </a:p>
-                  </a:txBody>
-                  <a:tcPr/>
-                </a:tc>
-                <a:tc>
-                  <a:txBody>
-                    <a:bodyPr/>
-                    <a:lstStyle/>
-                    <a:p>
-                      <a:r>
-                        <a:t>JUIN</a:t>
-                      </a:r>
-                    </a:p>
-                  </a:txBody>
-                  <a:tcPr/>
-                </a:tc>
-                <a:tc>
-                  <a:txBody>
-                    <a:bodyPr/>
-                    <a:lstStyle/>
-                    <a:p>
-                      <a:r>
-                        <a:t>Du 01/06/2024 Au 31/09/2024</a:t>
-                      </a:r>
-                    </a:p>
-                  </a:txBody>
-                  <a:tcPr/>
-                </a:tc>
-                <a:tc>
-                  <a:txBody>
-                    <a:bodyPr/>
-                    <a:lstStyle/>
-                    <a:p>
-                      <a:r>
-                        <a:t>Du 01/06/2024 Au 31/09/2024</a:t>
-                      </a:r>
-                    </a:p>
-                  </a:txBody>
-                  <a:tcPr/>
-                </a:tc>
-                <a:tc>
-                  <a:txBody>
-                    <a:bodyPr/>
-                    <a:lstStyle/>
-                    <a:p/>
-                  </a:txBody>
-                  <a:tcPr/>
-                </a:tc>
-                <a:tc>
-                  <a:txBody>
-                    <a:bodyPr/>
-                    <a:lstStyle/>
-                    <a:p>
-                      <a:r>
-                        <a:t>0660127763 AZEDDINE</a:t>
-                      </a:r>
-                    </a:p>
-                  </a:txBody>
-                  <a:tcPr/>
-                </a:tc>
-                <a:tc>
-                  <a:txBody>
-                    <a:bodyPr/>
-                    <a:lstStyle/>
-                    <a:p/>
-                  </a:txBody>
-                  <a:tcPr/>
-                </a:tc>
-                <a:tc>
-                  <a:txBody>
-                    <a:bodyPr/>
-                    <a:lstStyle/>
-                    <a:p>
-                      <a:r>
-                        <a:t>CASABLANCA</a:t>
-                      </a:r>
-                    </a:p>
-                  </a:txBody>
-                  <a:tcPr/>
-                </a:tc>
-                <a:tc>
-                  <a:txBody>
-                    <a:bodyPr/>
-                    <a:lstStyle/>
-                    <a:p>
-                      <a:r>
-                        <a:t>Mohammadia</a:t>
-                      </a:r>
-                    </a:p>
-                  </a:txBody>
-                  <a:tcPr/>
-                </a:tc>
-                <a:tc>
-                  <a:txBody>
-                    <a:bodyPr/>
-                    <a:lstStyle/>
-                    <a:p>
-                      <a:r>
-                        <a:t>33.685353,-7.387889</a:t>
-                      </a:r>
-                    </a:p>
-                  </a:txBody>
-                  <a:tcPr/>
-                </a:tc>
-                <a:tc>
-                  <a:txBody>
-                    <a:bodyPr/>
-                    <a:lstStyle/>
-                    <a:p>
-                      <a:r>
-                        <a:t>33.683649,-7.385638</a:t>
-                      </a:r>
-                    </a:p>
-                  </a:txBody>
-                  <a:tcPr/>
-                </a:tc>
-                <a:tc>
-                  <a:txBody>
-                    <a:bodyPr/>
-                    <a:lstStyle/>
-                    <a:p/>
-                  </a:txBody>
-                  <a:tcPr/>
-                </a:tc>
-                <a:tc>
-                  <a:txBody>
-                    <a:bodyPr/>
-                    <a:lstStyle/>
-                    <a:p/>
-                  </a:txBody>
-                  <a:tcPr/>
-                </a:tc>
-              </a:tr>
-              <a:tr h="285750">
-                <a:tc>
-                  <a:txBody>
-                    <a:bodyPr/>
-                    <a:lstStyle/>
-                    <a:p>
-                      <a:r>
-                        <a:t>MOH707</a:t>
-                      </a:r>
-                    </a:p>
-                  </a:txBody>
-                  <a:tcPr/>
-                </a:tc>
-                <a:tc>
-                  <a:txBody>
-                    <a:bodyPr/>
-                    <a:lstStyle/>
-                    <a:p>
-                      <a:r>
-                        <a:t>VERNE</a:t>
-                      </a:r>
-                    </a:p>
-                  </a:txBody>
-                  <a:tcPr/>
-                </a:tc>
-                <a:tc>
-                  <a:txBody>
-                    <a:bodyPr/>
-                    <a:lstStyle/>
-                    <a:p>
-                      <a:r>
-                        <a:t>JUIN</a:t>
-                      </a:r>
-                    </a:p>
-                  </a:txBody>
-                  <a:tcPr/>
-                </a:tc>
-                <a:tc>
-                  <a:txBody>
-                    <a:bodyPr/>
-                    <a:lstStyle/>
-                    <a:p>
-                      <a:r>
-                        <a:t>Du 01/06/2024 Au 31/09/2024</a:t>
-                      </a:r>
-                    </a:p>
-                  </a:txBody>
-                  <a:tcPr/>
-                </a:tc>
-                <a:tc>
-                  <a:txBody>
-                    <a:bodyPr/>
-                    <a:lstStyle/>
-                    <a:p>
-                      <a:r>
-                        <a:t>Du 01/06/2024 Au 31/09/2024</a:t>
-                      </a:r>
-                    </a:p>
-                  </a:txBody>
-                  <a:tcPr/>
-                </a:tc>
-                <a:tc>
-                  <a:txBody>
-                    <a:bodyPr/>
-                    <a:lstStyle/>
-                    <a:p/>
-                  </a:txBody>
-                  <a:tcPr/>
-                </a:tc>
-                <a:tc>
-                  <a:txBody>
-                    <a:bodyPr/>
-                    <a:lstStyle/>
-                    <a:p>
-                      <a:r>
-                        <a:t>0660127763 AZEDDINE</a:t>
-                      </a:r>
-                    </a:p>
-                  </a:txBody>
-                  <a:tcPr/>
-                </a:tc>
-                <a:tc>
-                  <a:txBody>
-                    <a:bodyPr/>
-                    <a:lstStyle/>
-                    <a:p/>
-                  </a:txBody>
-                  <a:tcPr/>
-                </a:tc>
-                <a:tc>
-                  <a:txBody>
-                    <a:bodyPr/>
-                    <a:lstStyle/>
-                    <a:p>
-                      <a:r>
-                        <a:t>CASABLANCA</a:t>
-                      </a:r>
-                    </a:p>
-                  </a:txBody>
-                  <a:tcPr/>
-                </a:tc>
-                <a:tc>
-                  <a:txBody>
-                    <a:bodyPr/>
-                    <a:lstStyle/>
-                    <a:p>
-                      <a:r>
-                        <a:t>Mohammadia</a:t>
-                      </a:r>
-                    </a:p>
-                  </a:txBody>
-                  <a:tcPr/>
-                </a:tc>
-                <a:tc>
-                  <a:txBody>
-                    <a:bodyPr/>
-                    <a:lstStyle/>
-                    <a:p>
-                      <a:r>
-                        <a:t>33.690882,-7.382083</a:t>
-                      </a:r>
-                    </a:p>
-                  </a:txBody>
-                  <a:tcPr/>
-                </a:tc>
-                <a:tc>
-                  <a:txBody>
-                    <a:bodyPr/>
-                    <a:lstStyle/>
-                    <a:p>
-                      <a:r>
-                        <a:t>33.689770,-7.380831</a:t>
-                      </a:r>
-                    </a:p>
-                  </a:txBody>
-                  <a:tcPr/>
-                </a:tc>
-                <a:tc>
-                  <a:txBody>
-                    <a:bodyPr/>
-                    <a:lstStyle/>
-                    <a:p/>
-                  </a:txBody>
-                  <a:tcPr/>
-                </a:tc>
-                <a:tc>
-                  <a:txBody>
-                    <a:bodyPr/>
-                    <a:lstStyle/>
-                    <a:p/>
-                  </a:txBody>
-                  <a:tcPr/>
-                </a:tc>
-              </a:tr>
-              <a:tr h="285750">
-                <a:tc>
-                  <a:txBody>
-                    <a:bodyPr/>
-                    <a:lstStyle/>
-                    <a:p>
-                      <a:r>
-                        <a:t>MOH708</a:t>
-                      </a:r>
-                    </a:p>
-                  </a:txBody>
-                  <a:tcPr/>
-                </a:tc>
-                <a:tc>
-                  <a:txBody>
-                    <a:bodyPr/>
-                    <a:lstStyle/>
-                    <a:p>
-                      <a:r>
-                        <a:t>VERNE</a:t>
-                      </a:r>
-                    </a:p>
-                  </a:txBody>
-                  <a:tcPr/>
-                </a:tc>
-                <a:tc>
-                  <a:txBody>
-                    <a:bodyPr/>
-                    <a:lstStyle/>
-                    <a:p>
-                      <a:r>
-                        <a:t>JUIN</a:t>
-                      </a:r>
-                    </a:p>
-                  </a:txBody>
-                  <a:tcPr/>
-                </a:tc>
-                <a:tc>
-                  <a:txBody>
-                    <a:bodyPr/>
-                    <a:lstStyle/>
-                    <a:p>
-                      <a:r>
-                        <a:t>Du 01/06/2024 Au 31/09/2024</a:t>
-                      </a:r>
-                    </a:p>
-                  </a:txBody>
-                  <a:tcPr/>
-                </a:tc>
-                <a:tc>
-                  <a:txBody>
-                    <a:bodyPr/>
-                    <a:lstStyle/>
-                    <a:p>
-                      <a:r>
-                        <a:t>Du 01/06/2024 Au 31/09/2024</a:t>
-                      </a:r>
-                    </a:p>
-                  </a:txBody>
-                  <a:tcPr/>
-                </a:tc>
-                <a:tc>
-                  <a:txBody>
-                    <a:bodyPr/>
-                    <a:lstStyle/>
-                    <a:p/>
-                  </a:txBody>
-                  <a:tcPr/>
-                </a:tc>
-                <a:tc>
-                  <a:txBody>
-                    <a:bodyPr/>
-                    <a:lstStyle/>
-                    <a:p>
-                      <a:r>
-                        <a:t>0660127763 AZEDDINE</a:t>
-                      </a:r>
-                    </a:p>
-                  </a:txBody>
-                  <a:tcPr/>
-                </a:tc>
-                <a:tc>
-                  <a:txBody>
-                    <a:bodyPr/>
-                    <a:lstStyle/>
-                    <a:p/>
-                  </a:txBody>
-                  <a:tcPr/>
-                </a:tc>
-                <a:tc>
-                  <a:txBody>
-                    <a:bodyPr/>
-                    <a:lstStyle/>
-                    <a:p>
-                      <a:r>
-                        <a:t>CASABLANCA</a:t>
-                      </a:r>
-                    </a:p>
-                  </a:txBody>
-                  <a:tcPr/>
-                </a:tc>
-                <a:tc>
-                  <a:txBody>
-                    <a:bodyPr/>
-                    <a:lstStyle/>
-                    <a:p>
-                      <a:r>
-                        <a:t>Mohammadia</a:t>
-                      </a:r>
-                    </a:p>
-                  </a:txBody>
-                  <a:tcPr/>
-                </a:tc>
-                <a:tc>
-                  <a:txBody>
-                    <a:bodyPr/>
-                    <a:lstStyle/>
-                    <a:p>
-                      <a:r>
-                        <a:t>33.689684,-7.387657</a:t>
-                      </a:r>
-                    </a:p>
-                  </a:txBody>
-                  <a:tcPr/>
-                </a:tc>
-                <a:tc>
-                  <a:txBody>
-                    <a:bodyPr/>
-                    <a:lstStyle/>
-                    <a:p>
-                      <a:r>
-                        <a:t>33.6899172,-7.3879014</a:t>
-                      </a:r>
-                    </a:p>
-                  </a:txBody>
-                  <a:tcPr/>
-                </a:tc>
-                <a:tc>
-                  <a:txBody>
-                    <a:bodyPr/>
-                    <a:lstStyle/>
-                    <a:p/>
-                  </a:txBody>
-                  <a:tcPr/>
-                </a:tc>
-                <a:tc>
-                  <a:txBody>
-                    <a:bodyPr/>
-                    <a:lstStyle/>
-                    <a:p/>
-                  </a:txBody>
-                  <a:tcPr/>
-                </a:tc>
-              </a:tr>
-              <a:tr h="285750">
-                <a:tc>
-                  <a:txBody>
-                    <a:bodyPr/>
-                    <a:lstStyle/>
-                    <a:p>
-                      <a:r>
-                        <a:t>MOH669</a:t>
-                      </a:r>
-                    </a:p>
-                  </a:txBody>
-                  <a:tcPr/>
-                </a:tc>
-                <a:tc>
-                  <a:txBody>
-                    <a:bodyPr/>
-                    <a:lstStyle/>
-                    <a:p>
-                      <a:r>
-                        <a:t>VERNE</a:t>
-                      </a:r>
-                    </a:p>
-                  </a:txBody>
-                  <a:tcPr/>
-                </a:tc>
-                <a:tc>
-                  <a:txBody>
-                    <a:bodyPr/>
-                    <a:lstStyle/>
-                    <a:p>
-                      <a:r>
-                        <a:t>JUIN</a:t>
-                      </a:r>
-                    </a:p>
-                  </a:txBody>
-                  <a:tcPr/>
-                </a:tc>
-                <a:tc>
-                  <a:txBody>
-                    <a:bodyPr/>
-                    <a:lstStyle/>
-                    <a:p>
-                      <a:r>
-                        <a:t>Du 01/06/2024 Au 31/09/2024</a:t>
-                      </a:r>
-                    </a:p>
-                  </a:txBody>
-                  <a:tcPr/>
-                </a:tc>
-                <a:tc>
-                  <a:txBody>
-                    <a:bodyPr/>
-                    <a:lstStyle/>
-                    <a:p>
-                      <a:r>
-                        <a:t>Du 01/06/2024 Au 31/09/2024</a:t>
-                      </a:r>
-                    </a:p>
-                  </a:txBody>
-                  <a:tcPr/>
-                </a:tc>
-                <a:tc>
-                  <a:txBody>
-                    <a:bodyPr/>
-                    <a:lstStyle/>
-                    <a:p/>
-                  </a:txBody>
-                  <a:tcPr/>
-                </a:tc>
-                <a:tc>
-                  <a:txBody>
-                    <a:bodyPr/>
-                    <a:lstStyle/>
-                    <a:p>
-                      <a:r>
-                        <a:t>0660127763 AZEDDINE</a:t>
-                      </a:r>
-                    </a:p>
-                  </a:txBody>
-                  <a:tcPr/>
-                </a:tc>
-                <a:tc>
-                  <a:txBody>
-                    <a:bodyPr/>
-                    <a:lstStyle/>
-                    <a:p/>
-                  </a:txBody>
-                  <a:tcPr/>
-                </a:tc>
-                <a:tc>
-                  <a:txBody>
-                    <a:bodyPr/>
-                    <a:lstStyle/>
-                    <a:p>
-                      <a:r>
-                        <a:t>CASABLANCA</a:t>
-                      </a:r>
-                    </a:p>
-                  </a:txBody>
-                  <a:tcPr/>
-                </a:tc>
-                <a:tc>
-                  <a:txBody>
-                    <a:bodyPr/>
-                    <a:lstStyle/>
-                    <a:p>
-                      <a:r>
-                        <a:t>Mohammadia</a:t>
-                      </a:r>
-                    </a:p>
-                  </a:txBody>
-                  <a:tcPr/>
-                </a:tc>
-                <a:tc>
-                  <a:txBody>
-                    <a:bodyPr/>
-                    <a:lstStyle/>
-                    <a:p>
-                      <a:r>
-                        <a:t>33.6893889,-7.3709722</a:t>
-                      </a:r>
-                    </a:p>
-                  </a:txBody>
-                  <a:tcPr/>
-                </a:tc>
-                <a:tc>
-                  <a:txBody>
-                    <a:bodyPr/>
-                    <a:lstStyle/>
-                    <a:p>
-                      <a:r>
-                        <a:t>33.6909874,-7.3704778</a:t>
-                      </a:r>
-                    </a:p>
-                  </a:txBody>
-                  <a:tcPr/>
-                </a:tc>
-                <a:tc>
-                  <a:txBody>
-                    <a:bodyPr/>
-                    <a:lstStyle/>
-                    <a:p/>
-                  </a:txBody>
-                  <a:tcPr/>
-                </a:tc>
-                <a:tc>
-                  <a:txBody>
-                    <a:bodyPr/>
-                    <a:lstStyle/>
-                    <a:p/>
-                  </a:txBody>
-                  <a:tcPr/>
-                </a:tc>
-              </a:tr>
-              <a:tr h="285750">
-                <a:tc>
-                  <a:txBody>
-                    <a:bodyPr/>
-                    <a:lstStyle/>
-                    <a:p>
-                      <a:r>
-                        <a:t>MOH715</a:t>
-                      </a:r>
-                    </a:p>
-                  </a:txBody>
-                  <a:tcPr/>
-                </a:tc>
-                <a:tc>
-                  <a:txBody>
-                    <a:bodyPr/>
-                    <a:lstStyle/>
-                    <a:p>
-                      <a:r>
-                        <a:t>VERNE</a:t>
-                      </a:r>
-                    </a:p>
-                  </a:txBody>
-                  <a:tcPr/>
-                </a:tc>
-                <a:tc>
-                  <a:txBody>
-                    <a:bodyPr/>
-                    <a:lstStyle/>
-                    <a:p>
-                      <a:r>
-                        <a:t>JUIN</a:t>
-                      </a:r>
-                    </a:p>
-                  </a:txBody>
-                  <a:tcPr/>
-                </a:tc>
-                <a:tc>
-                  <a:txBody>
-                    <a:bodyPr/>
-                    <a:lstStyle/>
-                    <a:p>
-                      <a:r>
-                        <a:t>Du 01/06/2024 Au 31/09/2024</a:t>
-                      </a:r>
-                    </a:p>
-                  </a:txBody>
-                  <a:tcPr/>
-                </a:tc>
-                <a:tc>
-                  <a:txBody>
-                    <a:bodyPr/>
-                    <a:lstStyle/>
-                    <a:p>
-                      <a:r>
-                        <a:t>Du 01/06/2024 Au 31/09/2024</a:t>
-                      </a:r>
-                    </a:p>
-                  </a:txBody>
-                  <a:tcPr/>
-                </a:tc>
-                <a:tc>
-                  <a:txBody>
-                    <a:bodyPr/>
-                    <a:lstStyle/>
-                    <a:p/>
-                  </a:txBody>
-                  <a:tcPr/>
-                </a:tc>
-                <a:tc>
-                  <a:txBody>
-                    <a:bodyPr/>
-                    <a:lstStyle/>
-                    <a:p>
-                      <a:r>
-                        <a:t>0660127763 AZEDDINE</a:t>
-                      </a:r>
-                    </a:p>
-                  </a:txBody>
-                  <a:tcPr/>
-                </a:tc>
-                <a:tc>
-                  <a:txBody>
-                    <a:bodyPr/>
-                    <a:lstStyle/>
-                    <a:p/>
-                  </a:txBody>
-                  <a:tcPr/>
-                </a:tc>
-                <a:tc>
-                  <a:txBody>
-                    <a:bodyPr/>
-                    <a:lstStyle/>
-                    <a:p>
-                      <a:r>
-                        <a:t>CASABLANCA</a:t>
-                      </a:r>
-                    </a:p>
-                  </a:txBody>
-                  <a:tcPr/>
-                </a:tc>
-                <a:tc>
-                  <a:txBody>
-                    <a:bodyPr/>
-                    <a:lstStyle/>
-                    <a:p>
-                      <a:r>
-                        <a:t>Mohammadia</a:t>
-                      </a:r>
-                    </a:p>
-                  </a:txBody>
-                  <a:tcPr/>
-                </a:tc>
-                <a:tc>
-                  <a:txBody>
-                    <a:bodyPr/>
-                    <a:lstStyle/>
-                    <a:p>
-                      <a:r>
-                        <a:t>33.696611,-7.377861</a:t>
-                      </a:r>
-                    </a:p>
-                  </a:txBody>
-                  <a:tcPr/>
-                </a:tc>
-                <a:tc>
-                  <a:txBody>
-                    <a:bodyPr/>
-                    <a:lstStyle/>
-                    <a:p>
-                      <a:r>
-                        <a:t>33.694875,-7.375636</a:t>
-                      </a:r>
-                    </a:p>
-                  </a:txBody>
-                  <a:tcPr/>
-                </a:tc>
-                <a:tc>
-                  <a:txBody>
-                    <a:bodyPr/>
-                    <a:lstStyle/>
-                    <a:p/>
-                  </a:txBody>
-                  <a:tcPr/>
-                </a:tc>
-                <a:tc>
-                  <a:txBody>
-                    <a:bodyPr/>
-                    <a:lstStyle/>
-                    <a:p/>
-                  </a:txBody>
-                  <a:tcPr/>
-                </a:tc>
-              </a:tr>
-              <a:tr h="285750">
-                <a:tc>
-                  <a:txBody>
-                    <a:bodyPr/>
-                    <a:lstStyle/>
-                    <a:p>
-                      <a:r>
-                        <a:t>MOH629</a:t>
-                      </a:r>
-                    </a:p>
-                  </a:txBody>
-                  <a:tcPr/>
-                </a:tc>
-                <a:tc>
-                  <a:txBody>
-                    <a:bodyPr/>
-                    <a:lstStyle/>
-                    <a:p>
-                      <a:r>
-                        <a:t>VERNE</a:t>
-                      </a:r>
-                    </a:p>
-                  </a:txBody>
-                  <a:tcPr/>
-                </a:tc>
-                <a:tc>
-                  <a:txBody>
-                    <a:bodyPr/>
-                    <a:lstStyle/>
-                    <a:p>
-                      <a:r>
-                        <a:t>JUIN</a:t>
-                      </a:r>
-                    </a:p>
-                  </a:txBody>
-                  <a:tcPr/>
-                </a:tc>
-                <a:tc>
-                  <a:txBody>
-                    <a:bodyPr/>
-                    <a:lstStyle/>
-                    <a:p>
-                      <a:r>
-                        <a:t>Du 01/06/2024 Au 31/09/2024</a:t>
-                      </a:r>
-                    </a:p>
-                  </a:txBody>
-                  <a:tcPr/>
-                </a:tc>
-                <a:tc>
-                  <a:txBody>
-                    <a:bodyPr/>
-                    <a:lstStyle/>
-                    <a:p>
-                      <a:r>
-                        <a:t>Du 01/06/2024 Au 31/09/2024</a:t>
-                      </a:r>
-                    </a:p>
-                  </a:txBody>
-                  <a:tcPr/>
-                </a:tc>
-                <a:tc>
-                  <a:txBody>
-                    <a:bodyPr/>
-                    <a:lstStyle/>
-                    <a:p/>
-                  </a:txBody>
-                  <a:tcPr/>
-                </a:tc>
-                <a:tc>
-                  <a:txBody>
-                    <a:bodyPr/>
-                    <a:lstStyle/>
-                    <a:p>
-                      <a:r>
-                        <a:t>0660127763 AZEDDINE</a:t>
-                      </a:r>
-                    </a:p>
-                  </a:txBody>
-                  <a:tcPr/>
-                </a:tc>
-                <a:tc>
-                  <a:txBody>
-                    <a:bodyPr/>
-                    <a:lstStyle/>
-                    <a:p/>
-                  </a:txBody>
-                  <a:tcPr/>
-                </a:tc>
-                <a:tc>
-                  <a:txBody>
-                    <a:bodyPr/>
-                    <a:lstStyle/>
-                    <a:p>
-                      <a:r>
-                        <a:t>CASABLANCA</a:t>
-                      </a:r>
-                    </a:p>
-                  </a:txBody>
-                  <a:tcPr/>
-                </a:tc>
-                <a:tc>
-                  <a:txBody>
-                    <a:bodyPr/>
-                    <a:lstStyle/>
-                    <a:p>
-                      <a:r>
-                        <a:t>Mohammadia</a:t>
-                      </a:r>
-                    </a:p>
-                  </a:txBody>
-                  <a:tcPr/>
-                </a:tc>
-                <a:tc>
-                  <a:txBody>
-                    <a:bodyPr/>
-                    <a:lstStyle/>
-                    <a:p>
-                      <a:r>
-                        <a:t>33.694361,-7.362472</a:t>
-                      </a:r>
-                    </a:p>
-                  </a:txBody>
-                  <a:tcPr/>
-                </a:tc>
-                <a:tc>
-                  <a:txBody>
-                    <a:bodyPr/>
-                    <a:lstStyle/>
-                    <a:p>
-                      <a:r>
-                        <a:t>33.696719,-7.366903</a:t>
-                      </a:r>
-                    </a:p>
-                  </a:txBody>
-                  <a:tcPr/>
-                </a:tc>
-                <a:tc>
-                  <a:txBody>
-                    <a:bodyPr/>
-                    <a:lstStyle/>
-                    <a:p/>
-                  </a:txBody>
-                  <a:tcPr/>
-                </a:tc>
-                <a:tc>
-                  <a:txBody>
-                    <a:bodyPr/>
-                    <a:lstStyle/>
-                    <a:p/>
-                  </a:txBody>
-                  <a:tcPr/>
-                </a:tc>
-              </a:tr>
-              <a:tr h="285750">
-                <a:tc>
-                  <a:txBody>
-                    <a:bodyPr/>
-                    <a:lstStyle/>
-                    <a:p>
-                      <a:r>
-                        <a:t>MOH704</a:t>
-                      </a:r>
-                    </a:p>
-                  </a:txBody>
-                  <a:tcPr/>
-                </a:tc>
-                <a:tc>
-                  <a:txBody>
-                    <a:bodyPr/>
-                    <a:lstStyle/>
-                    <a:p>
-                      <a:r>
-                        <a:t>VERNE</a:t>
-                      </a:r>
-                    </a:p>
-                  </a:txBody>
-                  <a:tcPr/>
-                </a:tc>
-                <a:tc>
-                  <a:txBody>
-                    <a:bodyPr/>
-                    <a:lstStyle/>
-                    <a:p>
-                      <a:r>
-                        <a:t>JUIN</a:t>
-                      </a:r>
-                    </a:p>
-                  </a:txBody>
-                  <a:tcPr/>
-                </a:tc>
-                <a:tc>
-                  <a:txBody>
-                    <a:bodyPr/>
-                    <a:lstStyle/>
-                    <a:p>
-                      <a:r>
-                        <a:t>Du 01/06/2024 Au 31/09/2024</a:t>
-                      </a:r>
-                    </a:p>
-                  </a:txBody>
-                  <a:tcPr/>
-                </a:tc>
-                <a:tc>
-                  <a:txBody>
-                    <a:bodyPr/>
-                    <a:lstStyle/>
-                    <a:p>
-                      <a:r>
-                        <a:t>Du 01/06/2024 Au 31/09/2024</a:t>
-                      </a:r>
-                    </a:p>
-                  </a:txBody>
-                  <a:tcPr/>
-                </a:tc>
-                <a:tc>
-                  <a:txBody>
-                    <a:bodyPr/>
-                    <a:lstStyle/>
-                    <a:p/>
-                  </a:txBody>
-                  <a:tcPr/>
-                </a:tc>
-                <a:tc>
-                  <a:txBody>
-                    <a:bodyPr/>
-                    <a:lstStyle/>
-                    <a:p>
-                      <a:r>
-                        <a:t>0660127763 AZEDDINE</a:t>
-                      </a:r>
-                    </a:p>
-                  </a:txBody>
-                  <a:tcPr/>
-                </a:tc>
-                <a:tc>
-                  <a:txBody>
-                    <a:bodyPr/>
-                    <a:lstStyle/>
-                    <a:p/>
-                  </a:txBody>
-                  <a:tcPr/>
-                </a:tc>
-                <a:tc>
-                  <a:txBody>
-                    <a:bodyPr/>
-                    <a:lstStyle/>
-                    <a:p>
-                      <a:r>
-                        <a:t>CASABLANCA</a:t>
-                      </a:r>
-                    </a:p>
-                  </a:txBody>
-                  <a:tcPr/>
-                </a:tc>
-                <a:tc>
-                  <a:txBody>
-                    <a:bodyPr/>
-                    <a:lstStyle/>
-                    <a:p>
-                      <a:r>
-                        <a:t>Mohammadia</a:t>
-                      </a:r>
-                    </a:p>
-                  </a:txBody>
-                  <a:tcPr/>
-                </a:tc>
-                <a:tc>
-                  <a:txBody>
-                    <a:bodyPr/>
-                    <a:lstStyle/>
-                    <a:p>
-                      <a:r>
-                        <a:t>33.697836,-7.351515</a:t>
-                      </a:r>
-                    </a:p>
-                  </a:txBody>
-                  <a:tcPr/>
-                </a:tc>
-                <a:tc>
-                  <a:txBody>
-                    <a:bodyPr/>
-                    <a:lstStyle/>
-                    <a:p>
-                      <a:r>
-                        <a:t>33.698122,-7.358454</a:t>
-                      </a:r>
-                    </a:p>
-                  </a:txBody>
-                  <a:tcPr/>
-                </a:tc>
-                <a:tc>
-                  <a:txBody>
-                    <a:bodyPr/>
-                    <a:lstStyle/>
-                    <a:p/>
-                  </a:txBody>
-                  <a:tcPr/>
-                </a:tc>
-                <a:tc>
-                  <a:txBody>
-                    <a:bodyPr/>
-                    <a:lstStyle/>
-                    <a:p/>
-                  </a:txBody>
-                  <a:tcPr/>
-                </a:tc>
-              </a:tr>
-              <a:tr h="285750">
-                <a:tc>
-                  <a:txBody>
-                    <a:bodyPr/>
-                    <a:lstStyle/>
-                    <a:p>
-                      <a:r>
-                        <a:t>MOH685</a:t>
-                      </a:r>
-                    </a:p>
-                  </a:txBody>
-                  <a:tcPr/>
-                </a:tc>
-                <a:tc>
-                  <a:txBody>
-                    <a:bodyPr/>
-                    <a:lstStyle/>
-                    <a:p>
-                      <a:r>
-                        <a:t>VERNE</a:t>
-                      </a:r>
-                    </a:p>
-                  </a:txBody>
-                  <a:tcPr/>
-                </a:tc>
-                <a:tc>
-                  <a:txBody>
-                    <a:bodyPr/>
-                    <a:lstStyle/>
-                    <a:p>
-                      <a:r>
-                        <a:t>JUIN</a:t>
-                      </a:r>
-                    </a:p>
-                  </a:txBody>
-                  <a:tcPr/>
-                </a:tc>
-                <a:tc>
-                  <a:txBody>
-                    <a:bodyPr/>
-                    <a:lstStyle/>
-                    <a:p>
-                      <a:r>
-                        <a:t>Du 01/06/2024 Au 31/09/2024</a:t>
-                      </a:r>
-                    </a:p>
-                  </a:txBody>
-                  <a:tcPr/>
-                </a:tc>
-                <a:tc>
-                  <a:txBody>
-                    <a:bodyPr/>
-                    <a:lstStyle/>
-                    <a:p>
-                      <a:r>
-                        <a:t>Du 01/06/2024 Au 31/09/2024</a:t>
-                      </a:r>
-                    </a:p>
-                  </a:txBody>
-                  <a:tcPr/>
-                </a:tc>
-                <a:tc>
-                  <a:txBody>
-                    <a:bodyPr/>
-                    <a:lstStyle/>
-                    <a:p/>
-                  </a:txBody>
-                  <a:tcPr/>
-                </a:tc>
-                <a:tc>
-                  <a:txBody>
-                    <a:bodyPr/>
-                    <a:lstStyle/>
-                    <a:p>
-                      <a:r>
-                        <a:t>0660127763 AZEDDINE</a:t>
-                      </a:r>
-                    </a:p>
-                  </a:txBody>
-                  <a:tcPr/>
-                </a:tc>
-                <a:tc>
-                  <a:txBody>
-                    <a:bodyPr/>
-                    <a:lstStyle/>
-                    <a:p/>
-                  </a:txBody>
-                  <a:tcPr/>
-                </a:tc>
-                <a:tc>
-                  <a:txBody>
-                    <a:bodyPr/>
-                    <a:lstStyle/>
-                    <a:p>
-                      <a:r>
-                        <a:t>CASABLANCA</a:t>
-                      </a:r>
-                    </a:p>
-                  </a:txBody>
-                  <a:tcPr/>
-                </a:tc>
-                <a:tc>
-                  <a:txBody>
-                    <a:bodyPr/>
-                    <a:lstStyle/>
-                    <a:p>
-                      <a:r>
-                        <a:t>Mohammadia</a:t>
-                      </a:r>
-                    </a:p>
-                  </a:txBody>
-                  <a:tcPr/>
-                </a:tc>
-                <a:tc>
-                  <a:txBody>
-                    <a:bodyPr/>
-                    <a:lstStyle/>
-                    <a:p>
-                      <a:r>
-                        <a:t>33.69817,-7.400306</a:t>
-                      </a:r>
-                    </a:p>
-                  </a:txBody>
-                  <a:tcPr/>
-                </a:tc>
-                <a:tc>
-                  <a:txBody>
-                    <a:bodyPr/>
-                    <a:lstStyle/>
-                    <a:p>
-                      <a:r>
-                        <a:t>33.6986762,-7.3994109</a:t>
-                      </a:r>
-                    </a:p>
-                  </a:txBody>
-                  <a:tcPr/>
-                </a:tc>
-                <a:tc>
-                  <a:txBody>
-                    <a:bodyPr/>
-                    <a:lstStyle/>
-                    <a:p/>
-                  </a:txBody>
-                  <a:tcPr/>
-                </a:tc>
-                <a:tc>
-                  <a:txBody>
-                    <a:bodyPr/>
-                    <a:lstStyle/>
-                    <a:p/>
-                  </a:txBody>
-                  <a:tcPr/>
-                </a:tc>
-              </a:tr>
-              <a:tr h="285750">
-                <a:tc>
-                  <a:txBody>
-                    <a:bodyPr/>
-                    <a:lstStyle/>
-                    <a:p>
-                      <a:r>
-                        <a:t>MOH710</a:t>
-                      </a:r>
-                    </a:p>
-                  </a:txBody>
-                  <a:tcPr/>
-                </a:tc>
-                <a:tc>
-                  <a:txBody>
-                    <a:bodyPr/>
-                    <a:lstStyle/>
-                    <a:p>
-                      <a:r>
-                        <a:t>VERNE</a:t>
-                      </a:r>
-                    </a:p>
-                  </a:txBody>
-                  <a:tcPr/>
-                </a:tc>
-                <a:tc>
-                  <a:txBody>
-                    <a:bodyPr/>
-                    <a:lstStyle/>
-                    <a:p>
-                      <a:r>
-                        <a:t>JUIN</a:t>
-                      </a:r>
-                    </a:p>
-                  </a:txBody>
-                  <a:tcPr/>
-                </a:tc>
-                <a:tc>
-                  <a:txBody>
-                    <a:bodyPr/>
-                    <a:lstStyle/>
-                    <a:p>
-                      <a:r>
-                        <a:t>Du 01/06/2024 Au 31/09/2024</a:t>
-                      </a:r>
-                    </a:p>
-                  </a:txBody>
-                  <a:tcPr/>
-                </a:tc>
-                <a:tc>
-                  <a:txBody>
-                    <a:bodyPr/>
-                    <a:lstStyle/>
-                    <a:p>
-                      <a:r>
-                        <a:t>Du 01/06/2024 Au 31/09/2024</a:t>
-                      </a:r>
-                    </a:p>
-                  </a:txBody>
-                  <a:tcPr/>
-                </a:tc>
-                <a:tc>
-                  <a:txBody>
-                    <a:bodyPr/>
-                    <a:lstStyle/>
-                    <a:p/>
-                  </a:txBody>
-                  <a:tcPr/>
-                </a:tc>
-                <a:tc>
-                  <a:txBody>
-                    <a:bodyPr/>
-                    <a:lstStyle/>
-                    <a:p>
-                      <a:r>
-                        <a:t>0660127763 AZEDDINE</a:t>
-                      </a:r>
-                    </a:p>
-                  </a:txBody>
-                  <a:tcPr/>
-                </a:tc>
-                <a:tc>
-                  <a:txBody>
-                    <a:bodyPr/>
-                    <a:lstStyle/>
-                    <a:p/>
-                  </a:txBody>
-                  <a:tcPr/>
-                </a:tc>
-                <a:tc>
-                  <a:txBody>
-                    <a:bodyPr/>
-                    <a:lstStyle/>
-                    <a:p>
-                      <a:r>
-                        <a:t>CASABLANCA</a:t>
-                      </a:r>
-                    </a:p>
-                  </a:txBody>
-                  <a:tcPr/>
-                </a:tc>
-                <a:tc>
-                  <a:txBody>
-                    <a:bodyPr/>
-                    <a:lstStyle/>
-                    <a:p>
-                      <a:r>
-                        <a:t>Mohammadia</a:t>
-                      </a:r>
-                    </a:p>
-                  </a:txBody>
-                  <a:tcPr/>
-                </a:tc>
-                <a:tc>
-                  <a:txBody>
-                    <a:bodyPr/>
-                    <a:lstStyle/>
-                    <a:p>
-                      <a:r>
-                        <a:t>33.7025,-7.363889</a:t>
-                      </a:r>
-                    </a:p>
-                  </a:txBody>
-                  <a:tcPr/>
-                </a:tc>
-                <a:tc>
-                  <a:txBody>
-                    <a:bodyPr/>
-                    <a:lstStyle/>
-                    <a:p>
-                      <a:r>
-                        <a:t>33.7006971,-7.3624697</a:t>
-                      </a:r>
-                    </a:p>
-                  </a:txBody>
-                  <a:tcPr/>
-                </a:tc>
-                <a:tc>
-                  <a:txBody>
-                    <a:bodyPr/>
-                    <a:lstStyle/>
-                    <a:p/>
-                  </a:txBody>
-                  <a:tcPr/>
-                </a:tc>
-                <a:tc>
-                  <a:txBody>
-                    <a:bodyPr/>
-                    <a:lstStyle/>
-                    <a:p/>
-                  </a:txBody>
-                  <a:tcPr/>
-                </a:tc>
-              </a:tr>
-              <a:tr h="285750">
-                <a:tc>
-                  <a:txBody>
-                    <a:bodyPr/>
-                    <a:lstStyle/>
-                    <a:p>
-                      <a:r>
-                        <a:t>MOH711</a:t>
-                      </a:r>
-                    </a:p>
-                  </a:txBody>
-                  <a:tcPr/>
-                </a:tc>
-                <a:tc>
-                  <a:txBody>
-                    <a:bodyPr/>
-                    <a:lstStyle/>
-                    <a:p>
-                      <a:r>
-                        <a:t>VERNE</a:t>
-                      </a:r>
-                    </a:p>
-                  </a:txBody>
-                  <a:tcPr/>
-                </a:tc>
-                <a:tc>
-                  <a:txBody>
-                    <a:bodyPr/>
-                    <a:lstStyle/>
-                    <a:p>
-                      <a:r>
-                        <a:t>JUIN</a:t>
-                      </a:r>
-                    </a:p>
-                  </a:txBody>
-                  <a:tcPr/>
-                </a:tc>
-                <a:tc>
-                  <a:txBody>
-                    <a:bodyPr/>
-                    <a:lstStyle/>
-                    <a:p>
-                      <a:r>
-                        <a:t>Du 01/06/2024 Au 31/09/2024</a:t>
-                      </a:r>
-                    </a:p>
-                  </a:txBody>
-                  <a:tcPr/>
-                </a:tc>
-                <a:tc>
-                  <a:txBody>
-                    <a:bodyPr/>
-                    <a:lstStyle/>
-                    <a:p>
-                      <a:r>
-                        <a:t>Du 01/06/2024 Au 31/09/2024</a:t>
-                      </a:r>
-                    </a:p>
-                  </a:txBody>
-                  <a:tcPr/>
-                </a:tc>
-                <a:tc>
-                  <a:txBody>
-                    <a:bodyPr/>
-                    <a:lstStyle/>
-                    <a:p/>
-                  </a:txBody>
-                  <a:tcPr/>
-                </a:tc>
-                <a:tc>
-                  <a:txBody>
-                    <a:bodyPr/>
-                    <a:lstStyle/>
-                    <a:p>
-                      <a:r>
-                        <a:t>0660127763 AZEDDINE</a:t>
-                      </a:r>
-                    </a:p>
-                  </a:txBody>
-                  <a:tcPr/>
-                </a:tc>
-                <a:tc>
-                  <a:txBody>
-                    <a:bodyPr/>
-                    <a:lstStyle/>
-                    <a:p/>
-                  </a:txBody>
-                  <a:tcPr/>
-                </a:tc>
-                <a:tc>
-                  <a:txBody>
-                    <a:bodyPr/>
-                    <a:lstStyle/>
-                    <a:p>
-                      <a:r>
-                        <a:t>CASABLANCA</a:t>
-                      </a:r>
-                    </a:p>
-                  </a:txBody>
-                  <a:tcPr/>
-                </a:tc>
-                <a:tc>
-                  <a:txBody>
-                    <a:bodyPr/>
-                    <a:lstStyle/>
-                    <a:p>
-                      <a:r>
-                        <a:t>Mohammadia</a:t>
-                      </a:r>
-                    </a:p>
-                  </a:txBody>
-                  <a:tcPr/>
-                </a:tc>
-                <a:tc>
-                  <a:txBody>
-                    <a:bodyPr/>
-                    <a:lstStyle/>
-                    <a:p>
-                      <a:r>
-                        <a:t>33.700556,-7.357389</a:t>
-                      </a:r>
-                    </a:p>
-                  </a:txBody>
-                  <a:tcPr/>
-                </a:tc>
-                <a:tc>
-                  <a:txBody>
-                    <a:bodyPr/>
-                    <a:lstStyle/>
-                    <a:p>
-                      <a:r>
-                        <a:t>33.701973,-7.360872</a:t>
-                      </a:r>
-                    </a:p>
-                  </a:txBody>
-                  <a:tcPr/>
-                </a:tc>
-                <a:tc>
-                  <a:txBody>
-                    <a:bodyPr/>
-                    <a:lstStyle/>
-                    <a:p/>
-                  </a:txBody>
-                  <a:tcPr/>
-                </a:tc>
-                <a:tc>
-                  <a:txBody>
-                    <a:bodyPr/>
-                    <a:lstStyle/>
-                    <a:p/>
-                  </a:txBody>
-                  <a:tcPr/>
-                </a:tc>
-              </a:tr>
-              <a:tr h="285750">
-                <a:tc>
-                  <a:txBody>
-                    <a:bodyPr/>
-                    <a:lstStyle/>
-                    <a:p>
-                      <a:r>
-                        <a:t>MOH635</a:t>
-                      </a:r>
-                    </a:p>
-                  </a:txBody>
-                  <a:tcPr/>
-                </a:tc>
-                <a:tc>
-                  <a:txBody>
-                    <a:bodyPr/>
-                    <a:lstStyle/>
-                    <a:p>
-                      <a:r>
-                        <a:t>VERNE</a:t>
-                      </a:r>
-                    </a:p>
-                  </a:txBody>
-                  <a:tcPr/>
-                </a:tc>
-                <a:tc>
-                  <a:txBody>
-                    <a:bodyPr/>
-                    <a:lstStyle/>
-                    <a:p>
-                      <a:r>
-                        <a:t>JUIN</a:t>
-                      </a:r>
-                    </a:p>
-                  </a:txBody>
-                  <a:tcPr/>
-                </a:tc>
-                <a:tc>
-                  <a:txBody>
-                    <a:bodyPr/>
-                    <a:lstStyle/>
-                    <a:p>
-                      <a:r>
-                        <a:t>Du 01/06/2024 Au 31/09/2024</a:t>
-                      </a:r>
-                    </a:p>
-                  </a:txBody>
-                  <a:tcPr/>
-                </a:tc>
-                <a:tc>
-                  <a:txBody>
-                    <a:bodyPr/>
-                    <a:lstStyle/>
-                    <a:p>
-                      <a:r>
-                        <a:t>Du 01/06/2024 Au 31/09/2024</a:t>
-                      </a:r>
-                    </a:p>
-                  </a:txBody>
-                  <a:tcPr/>
-                </a:tc>
-                <a:tc>
-                  <a:txBody>
-                    <a:bodyPr/>
-                    <a:lstStyle/>
-                    <a:p/>
-                  </a:txBody>
-                  <a:tcPr/>
-                </a:tc>
-                <a:tc>
-                  <a:txBody>
-                    <a:bodyPr/>
-                    <a:lstStyle/>
-                    <a:p>
-                      <a:r>
-                        <a:t>0660127763 AZEDDINE</a:t>
-                      </a:r>
-                    </a:p>
-                  </a:txBody>
-                  <a:tcPr/>
-                </a:tc>
-                <a:tc>
-                  <a:txBody>
-                    <a:bodyPr/>
-                    <a:lstStyle/>
-                    <a:p/>
-                  </a:txBody>
-                  <a:tcPr/>
-                </a:tc>
-                <a:tc>
-                  <a:txBody>
-                    <a:bodyPr/>
-                    <a:lstStyle/>
-                    <a:p>
-                      <a:r>
-                        <a:t>CASABLANCA</a:t>
-                      </a:r>
-                    </a:p>
-                  </a:txBody>
-                  <a:tcPr/>
-                </a:tc>
-                <a:tc>
-                  <a:txBody>
-                    <a:bodyPr/>
-                    <a:lstStyle/>
-                    <a:p>
-                      <a:r>
-                        <a:t>Mohammadia</a:t>
-                      </a:r>
-                    </a:p>
-                  </a:txBody>
-                  <a:tcPr/>
-                </a:tc>
-                <a:tc>
-                  <a:txBody>
-                    <a:bodyPr/>
-                    <a:lstStyle/>
-                    <a:p>
-                      <a:r>
-                        <a:t>33.7081389,-7.3609167</a:t>
-                      </a:r>
-                    </a:p>
-                  </a:txBody>
-                  <a:tcPr/>
-                </a:tc>
-                <a:tc>
-                  <a:txBody>
-                    <a:bodyPr/>
-                    <a:lstStyle/>
-                    <a:p>
-                      <a:r>
-                        <a:t>33.705190,-7.357872</a:t>
-                      </a:r>
-                    </a:p>
-                  </a:txBody>
-                  <a:tcPr/>
-                </a:tc>
-                <a:tc>
-                  <a:txBody>
-                    <a:bodyPr/>
-                    <a:lstStyle/>
-                    <a:p/>
-                  </a:txBody>
-                  <a:tcPr/>
-                </a:tc>
-                <a:tc>
-                  <a:txBody>
-                    <a:bodyPr/>
-                    <a:lstStyle/>
-                    <a:p/>
-                  </a:txBody>
-                  <a:tcPr/>
-                </a:tc>
-              </a:tr>
-              <a:tr h="285750">
-                <a:tc>
-                  <a:txBody>
-                    <a:bodyPr/>
-                    <a:lstStyle/>
-                    <a:p>
-                      <a:r>
-                        <a:t>MOH650</a:t>
-                      </a:r>
-                    </a:p>
-                  </a:txBody>
-                  <a:tcPr/>
-                </a:tc>
-                <a:tc>
-                  <a:txBody>
-                    <a:bodyPr/>
-                    <a:lstStyle/>
-                    <a:p>
-                      <a:r>
-                        <a:t>VERNE</a:t>
-                      </a:r>
-                    </a:p>
-                  </a:txBody>
-                  <a:tcPr/>
-                </a:tc>
-                <a:tc>
-                  <a:txBody>
-                    <a:bodyPr/>
-                    <a:lstStyle/>
-                    <a:p>
-                      <a:r>
-                        <a:t>JUIN</a:t>
-                      </a:r>
-                    </a:p>
-                  </a:txBody>
-                  <a:tcPr/>
-                </a:tc>
-                <a:tc>
-                  <a:txBody>
-                    <a:bodyPr/>
-                    <a:lstStyle/>
-                    <a:p>
-                      <a:r>
-                        <a:t>Du 01/06/2024 Au 31/09/2024</a:t>
-                      </a:r>
-                    </a:p>
-                  </a:txBody>
-                  <a:tcPr/>
-                </a:tc>
-                <a:tc>
-                  <a:txBody>
-                    <a:bodyPr/>
-                    <a:lstStyle/>
-                    <a:p>
-                      <a:r>
-                        <a:t>Du 01/06/2024 Au 31/09/2024</a:t>
-                      </a:r>
-                    </a:p>
-                  </a:txBody>
-                  <a:tcPr/>
-                </a:tc>
-                <a:tc>
-                  <a:txBody>
-                    <a:bodyPr/>
-                    <a:lstStyle/>
-                    <a:p/>
-                  </a:txBody>
-                  <a:tcPr/>
-                </a:tc>
-                <a:tc>
-                  <a:txBody>
-                    <a:bodyPr/>
-                    <a:lstStyle/>
-                    <a:p>
-                      <a:r>
-                        <a:t>0660127763 AZEDDINE</a:t>
-                      </a:r>
-                    </a:p>
-                  </a:txBody>
-                  <a:tcPr/>
-                </a:tc>
-                <a:tc>
-                  <a:txBody>
-                    <a:bodyPr/>
-                    <a:lstStyle/>
-                    <a:p/>
-                  </a:txBody>
-                  <a:tcPr/>
-                </a:tc>
-                <a:tc>
-                  <a:txBody>
-                    <a:bodyPr/>
-                    <a:lstStyle/>
-                    <a:p>
-                      <a:r>
-                        <a:t>CASABLANCA</a:t>
-                      </a:r>
-                    </a:p>
-                  </a:txBody>
-                  <a:tcPr/>
-                </a:tc>
-                <a:tc>
-                  <a:txBody>
-                    <a:bodyPr/>
-                    <a:lstStyle/>
-                    <a:p>
-                      <a:r>
-                        <a:t>Mohammadia</a:t>
-                      </a:r>
-                    </a:p>
-                  </a:txBody>
-                  <a:tcPr/>
-                </a:tc>
-                <a:tc>
-                  <a:txBody>
-                    <a:bodyPr/>
-                    <a:lstStyle/>
-                    <a:p>
-                      <a:r>
-                        <a:t>33.708944,-7.40175</a:t>
-                      </a:r>
-                    </a:p>
-                  </a:txBody>
-                  <a:tcPr/>
-                </a:tc>
-                <a:tc>
-                  <a:txBody>
-                    <a:bodyPr/>
-                    <a:lstStyle/>
-                    <a:p>
+                    <a:bodyPr tIns="18288" bIns="18288" lIns="45720" rIns="45720"/>
+                    <a:lstStyle/>
+                    <a:p>
+                      <a:pPr>
+                        <a:defRPr sz="700">
+                          <a:latin typeface="Arial Narrow"/>
+                        </a:defRPr>
+                      </a:pPr>
                       <a:r>
                         <a:t>33.7076143,-7.4002506</a:t>
                       </a:r>
                     </a:p>
-                  </a:txBody>
-                  <a:tcPr/>
-                </a:tc>
-                <a:tc>
-                  <a:txBody>
-                    <a:bodyPr/>
-                    <a:lstStyle/>
-                    <a:p/>
-                  </a:txBody>
-                  <a:tcPr/>
-                </a:tc>
-                <a:tc>
-                  <a:txBody>
-                    <a:bodyPr/>
-                    <a:lstStyle/>
-                    <a:p/>
                   </a:txBody>
                   <a:tcPr/>
                 </a:tc>

</xml_diff>